<commit_message>
WWW is now under git. Map screenshots are now incorporated into git
</commit_message>
<xml_diff>
--- a/AQM_presentation_428.pptx
+++ b/AQM_presentation_428.pptx
@@ -28,8 +28,8 @@
     <p:sldId id="270" r:id="rId16"/>
     <p:sldId id="271" r:id="rId17"/>
     <p:sldId id="272" r:id="rId18"/>
-    <p:sldId id="273" r:id="rId19"/>
-    <p:sldId id="274" r:id="rId20"/>
+    <p:sldId id="274" r:id="rId19"/>
+    <p:sldId id="273" r:id="rId20"/>
     <p:sldId id="275" r:id="rId21"/>
     <p:sldId id="277" r:id="rId22"/>
     <p:sldId id="276" r:id="rId23"/>
@@ -218,7 +218,8 @@
           <a:p>
             <a:fld id="{84283771-67C4-0E44-BE9E-CDE65096B1EA}" type="datetimeFigureOut">
               <a:rPr lang="en-US" smtClean="0"/>
-              <a:t>4/26/09</a:t>
+              <a:pPr/>
+              <a:t>4/28/09</a:t>
             </a:fld>
             <a:endParaRPr lang="en-US"/>
           </a:p>
@@ -284,6 +285,7 @@
           <a:p>
             <a:fld id="{AD7A7926-379C-E641-BF37-E605595F34BA}" type="slidenum">
               <a:rPr lang="en-US" smtClean="0"/>
+              <a:pPr/>
               <a:t>‹#›</a:t>
             </a:fld>
             <a:endParaRPr lang="en-US"/>
@@ -379,7 +381,8 @@
           <a:p>
             <a:fld id="{D6C27E60-316B-0045-A298-156D88BE03D3}" type="datetimeFigureOut">
               <a:rPr lang="en-US" smtClean="0"/>
-              <a:t>4/26/09</a:t>
+              <a:pPr/>
+              <a:t>4/28/09</a:t>
             </a:fld>
             <a:endParaRPr lang="en-US"/>
           </a:p>
@@ -540,6 +543,7 @@
           <a:p>
             <a:fld id="{9EBEBA0C-0AD4-124C-BACA-15E282F741D9}" type="slidenum">
               <a:rPr lang="en-US" smtClean="0"/>
+              <a:pPr/>
               <a:t>‹#›</a:t>
             </a:fld>
             <a:endParaRPr lang="en-US"/>
@@ -645,6 +649,2140 @@
 </p:notesMaster>
 </file>
 
+<file path=ppt/notesSlides/notesSlide1.xml><?xml version="1.0" encoding="utf-8"?>
+<p:notes xmlns:a="http://schemas.openxmlformats.org/drawingml/2006/main" xmlns:r="http://schemas.openxmlformats.org/officeDocument/2006/relationships" xmlns:mc="http://schemas.openxmlformats.org/markup-compatibility/2006" xmlns:mv="urn:schemas-microsoft-com:mac:vml" xmlns:p="http://schemas.openxmlformats.org/presentationml/2006/main" mc:Ignorable="mv" mc:PreserveAttributes="mv:*">
+  <p:cSld>
+    <p:spTree>
+      <p:nvGrpSpPr>
+        <p:cNvPr id="1" name=""/>
+        <p:cNvGrpSpPr/>
+        <p:nvPr/>
+      </p:nvGrpSpPr>
+      <p:grpSpPr>
+        <a:xfrm>
+          <a:off x="0" y="0"/>
+          <a:ext cx="0" cy="0"/>
+          <a:chOff x="0" y="0"/>
+          <a:chExt cx="0" cy="0"/>
+        </a:xfrm>
+      </p:grpSpPr>
+      <p:sp>
+        <p:nvSpPr>
+          <p:cNvPr id="2" name="Slide Image Placeholder 1"/>
+          <p:cNvSpPr>
+            <a:spLocks noGrp="1" noRot="1" noChangeAspect="1"/>
+          </p:cNvSpPr>
+          <p:nvPr>
+            <p:ph type="sldImg"/>
+          </p:nvPr>
+        </p:nvSpPr>
+        <p:spPr/>
+      </p:sp>
+      <p:sp>
+        <p:nvSpPr>
+          <p:cNvPr id="3" name="Notes Placeholder 2"/>
+          <p:cNvSpPr>
+            <a:spLocks noGrp="1"/>
+          </p:cNvSpPr>
+          <p:nvPr>
+            <p:ph type="body" idx="1"/>
+          </p:nvPr>
+        </p:nvSpPr>
+        <p:spPr/>
+        <p:txBody>
+          <a:bodyPr>
+            <a:normAutofit/>
+          </a:bodyPr>
+          <a:lstStyle/>
+          <a:p>
+            <a:r>
+              <a:rPr lang="en-US" dirty="0" smtClean="0"/>
+              <a:t>Hello everybody. My name is Alex and today I’ll be presenting the evaluation of the impact of active queue management of WEB performance</a:t>
+            </a:r>
+            <a:r>
+              <a:rPr lang="en-US" dirty="0" smtClean="0"/>
+              <a:t>.</a:t>
+            </a:r>
+          </a:p>
+          <a:p>
+            <a:endParaRPr lang="en-US" dirty="0" smtClean="0"/>
+          </a:p>
+          <a:p>
+            <a:r>
+              <a:rPr lang="en-US" dirty="0" smtClean="0"/>
+              <a:t>Web was selected</a:t>
+            </a:r>
+            <a:r>
+              <a:rPr lang="en-US" dirty="0" smtClean="0"/>
+              <a:t> not by accident.</a:t>
+            </a:r>
+            <a:r>
+              <a:rPr lang="en-US" baseline="0" dirty="0" smtClean="0"/>
+              <a:t> </a:t>
+            </a:r>
+            <a:r>
+              <a:rPr lang="en-US" dirty="0" smtClean="0"/>
+              <a:t>It </a:t>
+            </a:r>
+            <a:r>
+              <a:rPr lang="en-US" dirty="0" smtClean="0"/>
+              <a:t>is one of the most popular services in the internet </a:t>
+            </a:r>
+            <a:r>
+              <a:rPr lang="en-US" dirty="0" smtClean="0"/>
+              <a:t>and, moreover, </a:t>
+            </a:r>
+            <a:r>
+              <a:rPr lang="en-US" dirty="0" smtClean="0"/>
+              <a:t>the response times, which are the main subject of the Active Queue Management (AQM), can have significant impact on user-perceived quality of service.</a:t>
+            </a:r>
+          </a:p>
+          <a:p>
+            <a:endParaRPr lang="en-US" dirty="0" smtClean="0"/>
+          </a:p>
+        </p:txBody>
+      </p:sp>
+      <p:sp>
+        <p:nvSpPr>
+          <p:cNvPr id="4" name="Slide Number Placeholder 3"/>
+          <p:cNvSpPr>
+            <a:spLocks noGrp="1"/>
+          </p:cNvSpPr>
+          <p:nvPr>
+            <p:ph type="sldNum" sz="quarter" idx="10"/>
+          </p:nvPr>
+        </p:nvSpPr>
+        <p:spPr/>
+        <p:txBody>
+          <a:bodyPr/>
+          <a:lstStyle/>
+          <a:p>
+            <a:fld id="{9EBEBA0C-0AD4-124C-BACA-15E282F741D9}" type="slidenum">
+              <a:rPr lang="en-US" smtClean="0"/>
+              <a:pPr/>
+              <a:t>1</a:t>
+            </a:fld>
+            <a:endParaRPr lang="en-US"/>
+          </a:p>
+        </p:txBody>
+      </p:sp>
+    </p:spTree>
+  </p:cSld>
+  <p:clrMapOvr>
+    <a:masterClrMapping/>
+  </p:clrMapOvr>
+</p:notes>
+</file>
+
+<file path=ppt/notesSlides/notesSlide10.xml><?xml version="1.0" encoding="utf-8"?>
+<p:notes xmlns:a="http://schemas.openxmlformats.org/drawingml/2006/main" xmlns:r="http://schemas.openxmlformats.org/officeDocument/2006/relationships" xmlns:mc="http://schemas.openxmlformats.org/markup-compatibility/2006" xmlns:mv="urn:schemas-microsoft-com:mac:vml" xmlns:p="http://schemas.openxmlformats.org/presentationml/2006/main" mc:Ignorable="mv" mc:PreserveAttributes="mv:*">
+  <p:cSld>
+    <p:spTree>
+      <p:nvGrpSpPr>
+        <p:cNvPr id="1" name=""/>
+        <p:cNvGrpSpPr/>
+        <p:nvPr/>
+      </p:nvGrpSpPr>
+      <p:grpSpPr>
+        <a:xfrm>
+          <a:off x="0" y="0"/>
+          <a:ext cx="0" cy="0"/>
+          <a:chOff x="0" y="0"/>
+          <a:chExt cx="0" cy="0"/>
+        </a:xfrm>
+      </p:grpSpPr>
+      <p:sp>
+        <p:nvSpPr>
+          <p:cNvPr id="2" name="Slide Image Placeholder 1"/>
+          <p:cNvSpPr>
+            <a:spLocks noGrp="1" noRot="1" noChangeAspect="1"/>
+          </p:cNvSpPr>
+          <p:nvPr>
+            <p:ph type="sldImg"/>
+          </p:nvPr>
+        </p:nvSpPr>
+        <p:spPr/>
+      </p:sp>
+      <p:sp>
+        <p:nvSpPr>
+          <p:cNvPr id="3" name="Notes Placeholder 2"/>
+          <p:cNvSpPr>
+            <a:spLocks noGrp="1"/>
+          </p:cNvSpPr>
+          <p:nvPr>
+            <p:ph type="body" idx="1"/>
+          </p:nvPr>
+        </p:nvSpPr>
+        <p:spPr/>
+        <p:txBody>
+          <a:bodyPr>
+            <a:normAutofit/>
+          </a:bodyPr>
+          <a:lstStyle/>
+          <a:p>
+            <a:r>
+              <a:rPr lang="en-US" dirty="0" smtClean="0"/>
+              <a:t>Let's move to the actual experiments and results. For the experiment they had build a laboratory </a:t>
+            </a:r>
+            <a:r>
+              <a:rPr lang="en-US" dirty="0" err="1" smtClean="0"/>
+              <a:t>testbed</a:t>
+            </a:r>
+            <a:r>
+              <a:rPr lang="en-US" dirty="0" smtClean="0"/>
+              <a:t>, where synthetic WEB traffic was generated using available model. In particular, this synthetic traffic include random request and reply sizes, random "user" think time (intervals between requests), the emulation of persistent connection (several requests within one TCP connection). One of the most interesting parts was the calibration task. The calibration using 1Gbps bottleneck capacity instead of 100Mbps gives a reference point of "uncongested" link. In other word, the maximum achievable effectiveness if network is uncongested.</a:t>
+            </a:r>
+          </a:p>
+        </p:txBody>
+      </p:sp>
+      <p:sp>
+        <p:nvSpPr>
+          <p:cNvPr id="4" name="Slide Number Placeholder 3"/>
+          <p:cNvSpPr>
+            <a:spLocks noGrp="1"/>
+          </p:cNvSpPr>
+          <p:nvPr>
+            <p:ph type="sldNum" sz="quarter" idx="10"/>
+          </p:nvPr>
+        </p:nvSpPr>
+        <p:spPr/>
+        <p:txBody>
+          <a:bodyPr/>
+          <a:lstStyle/>
+          <a:p>
+            <a:fld id="{9EBEBA0C-0AD4-124C-BACA-15E282F741D9}" type="slidenum">
+              <a:rPr lang="en-US" smtClean="0"/>
+              <a:pPr/>
+              <a:t>10</a:t>
+            </a:fld>
+            <a:endParaRPr lang="en-US"/>
+          </a:p>
+        </p:txBody>
+      </p:sp>
+    </p:spTree>
+  </p:cSld>
+  <p:clrMapOvr>
+    <a:masterClrMapping/>
+  </p:clrMapOvr>
+</p:notes>
+</file>
+
+<file path=ppt/notesSlides/notesSlide11.xml><?xml version="1.0" encoding="utf-8"?>
+<p:notes xmlns:a="http://schemas.openxmlformats.org/drawingml/2006/main" xmlns:r="http://schemas.openxmlformats.org/officeDocument/2006/relationships" xmlns:mc="http://schemas.openxmlformats.org/markup-compatibility/2006" xmlns:mv="urn:schemas-microsoft-com:mac:vml" xmlns:p="http://schemas.openxmlformats.org/presentationml/2006/main" mc:Ignorable="mv" mc:PreserveAttributes="mv:*">
+  <p:cSld>
+    <p:spTree>
+      <p:nvGrpSpPr>
+        <p:cNvPr id="1" name=""/>
+        <p:cNvGrpSpPr/>
+        <p:nvPr/>
+      </p:nvGrpSpPr>
+      <p:grpSpPr>
+        <a:xfrm>
+          <a:off x="0" y="0"/>
+          <a:ext cx="0" cy="0"/>
+          <a:chOff x="0" y="0"/>
+          <a:chExt cx="0" cy="0"/>
+        </a:xfrm>
+      </p:grpSpPr>
+      <p:sp>
+        <p:nvSpPr>
+          <p:cNvPr id="2" name="Slide Image Placeholder 1"/>
+          <p:cNvSpPr>
+            <a:spLocks noGrp="1" noRot="1" noChangeAspect="1"/>
+          </p:cNvSpPr>
+          <p:nvPr>
+            <p:ph type="sldImg"/>
+          </p:nvPr>
+        </p:nvSpPr>
+        <p:spPr/>
+      </p:sp>
+      <p:sp>
+        <p:nvSpPr>
+          <p:cNvPr id="3" name="Notes Placeholder 2"/>
+          <p:cNvSpPr>
+            <a:spLocks noGrp="1"/>
+          </p:cNvSpPr>
+          <p:nvPr>
+            <p:ph type="body" idx="1"/>
+          </p:nvPr>
+        </p:nvSpPr>
+        <p:spPr/>
+        <p:txBody>
+          <a:bodyPr>
+            <a:normAutofit/>
+          </a:bodyPr>
+          <a:lstStyle/>
+          <a:p>
+            <a:r>
+              <a:rPr lang="en-US" dirty="0" smtClean="0"/>
+              <a:t>The be able to feel the impact of AQM, the throughput was calibrated to generate various high load traffics 80%, 90%, and 98%, or 80Mbps, 90Mbps and 98Mbps. After calibration, test was run using appropriate AQM algorithm and 100Mbps bottleneck link size.</a:t>
+            </a:r>
+            <a:endParaRPr lang="en-US" dirty="0"/>
+          </a:p>
+        </p:txBody>
+      </p:sp>
+      <p:sp>
+        <p:nvSpPr>
+          <p:cNvPr id="4" name="Slide Number Placeholder 3"/>
+          <p:cNvSpPr>
+            <a:spLocks noGrp="1"/>
+          </p:cNvSpPr>
+          <p:nvPr>
+            <p:ph type="sldNum" sz="quarter" idx="10"/>
+          </p:nvPr>
+        </p:nvSpPr>
+        <p:spPr/>
+        <p:txBody>
+          <a:bodyPr/>
+          <a:lstStyle/>
+          <a:p>
+            <a:fld id="{9EBEBA0C-0AD4-124C-BACA-15E282F741D9}" type="slidenum">
+              <a:rPr lang="en-US" smtClean="0"/>
+              <a:pPr/>
+              <a:t>11</a:t>
+            </a:fld>
+            <a:endParaRPr lang="en-US"/>
+          </a:p>
+        </p:txBody>
+      </p:sp>
+    </p:spTree>
+  </p:cSld>
+  <p:clrMapOvr>
+    <a:masterClrMapping/>
+  </p:clrMapOvr>
+</p:notes>
+</file>
+
+<file path=ppt/notesSlides/notesSlide12.xml><?xml version="1.0" encoding="utf-8"?>
+<p:notes xmlns:a="http://schemas.openxmlformats.org/drawingml/2006/main" xmlns:r="http://schemas.openxmlformats.org/officeDocument/2006/relationships" xmlns:mc="http://schemas.openxmlformats.org/markup-compatibility/2006" xmlns:mv="urn:schemas-microsoft-com:mac:vml" xmlns:p="http://schemas.openxmlformats.org/presentationml/2006/main" mc:Ignorable="mv" mc:PreserveAttributes="mv:*">
+  <p:cSld>
+    <p:spTree>
+      <p:nvGrpSpPr>
+        <p:cNvPr id="1" name=""/>
+        <p:cNvGrpSpPr/>
+        <p:nvPr/>
+      </p:nvGrpSpPr>
+      <p:grpSpPr>
+        <a:xfrm>
+          <a:off x="0" y="0"/>
+          <a:ext cx="0" cy="0"/>
+          <a:chOff x="0" y="0"/>
+          <a:chExt cx="0" cy="0"/>
+        </a:xfrm>
+      </p:grpSpPr>
+      <p:sp>
+        <p:nvSpPr>
+          <p:cNvPr id="2" name="Slide Image Placeholder 1"/>
+          <p:cNvSpPr>
+            <a:spLocks noGrp="1" noRot="1" noChangeAspect="1"/>
+          </p:cNvSpPr>
+          <p:nvPr>
+            <p:ph type="sldImg"/>
+          </p:nvPr>
+        </p:nvSpPr>
+        <p:spPr/>
+      </p:sp>
+      <p:sp>
+        <p:nvSpPr>
+          <p:cNvPr id="3" name="Notes Placeholder 2"/>
+          <p:cNvSpPr>
+            <a:spLocks noGrp="1"/>
+          </p:cNvSpPr>
+          <p:nvPr>
+            <p:ph type="body" idx="1"/>
+          </p:nvPr>
+        </p:nvSpPr>
+        <p:spPr/>
+        <p:txBody>
+          <a:bodyPr>
+            <a:normAutofit/>
+          </a:bodyPr>
+          <a:lstStyle/>
+          <a:p>
+            <a:r>
+              <a:rPr lang="en-US" dirty="0" smtClean="0"/>
+              <a:t>OK. The results. In first experiments the only signaling mechanism of the congestion state for the TCP connections was selected packet drops.</a:t>
+            </a:r>
+          </a:p>
+          <a:p>
+            <a:endParaRPr lang="en-US" dirty="0" smtClean="0"/>
+          </a:p>
+          <a:p>
+            <a:r>
+              <a:rPr lang="en-US" dirty="0" smtClean="0"/>
+              <a:t>First, it should be noted, that in all their tests for all algorithms, the 50% of all requests was processed within first 128ms. This result shows, that at 80% load FIFO, PI and REM give the same result as in the case of uncongested network, which means of practically absence of congestion. They also noticed the strange behavior of ARED. Even without </a:t>
+            </a:r>
+            <a:r>
+              <a:rPr lang="en-US" dirty="0" err="1" smtClean="0"/>
+              <a:t>queueing</a:t>
+            </a:r>
+            <a:r>
+              <a:rPr lang="en-US" dirty="0" smtClean="0"/>
+              <a:t> ARED have negative impact on response time and they couldn't find any proper set of parameters which improves situation.</a:t>
+            </a:r>
+            <a:endParaRPr lang="en-US" dirty="0"/>
+          </a:p>
+        </p:txBody>
+      </p:sp>
+      <p:sp>
+        <p:nvSpPr>
+          <p:cNvPr id="4" name="Slide Number Placeholder 3"/>
+          <p:cNvSpPr>
+            <a:spLocks noGrp="1"/>
+          </p:cNvSpPr>
+          <p:nvPr>
+            <p:ph type="sldNum" sz="quarter" idx="10"/>
+          </p:nvPr>
+        </p:nvSpPr>
+        <p:spPr/>
+        <p:txBody>
+          <a:bodyPr/>
+          <a:lstStyle/>
+          <a:p>
+            <a:fld id="{9EBEBA0C-0AD4-124C-BACA-15E282F741D9}" type="slidenum">
+              <a:rPr lang="en-US" smtClean="0"/>
+              <a:pPr/>
+              <a:t>13</a:t>
+            </a:fld>
+            <a:endParaRPr lang="en-US"/>
+          </a:p>
+        </p:txBody>
+      </p:sp>
+    </p:spTree>
+  </p:cSld>
+  <p:clrMapOvr>
+    <a:masterClrMapping/>
+  </p:clrMapOvr>
+</p:notes>
+</file>
+
+<file path=ppt/notesSlides/notesSlide13.xml><?xml version="1.0" encoding="utf-8"?>
+<p:notes xmlns:a="http://schemas.openxmlformats.org/drawingml/2006/main" xmlns:r="http://schemas.openxmlformats.org/officeDocument/2006/relationships" xmlns:mc="http://schemas.openxmlformats.org/markup-compatibility/2006" xmlns:mv="urn:schemas-microsoft-com:mac:vml" xmlns:p="http://schemas.openxmlformats.org/presentationml/2006/main" mc:Ignorable="mv" mc:PreserveAttributes="mv:*">
+  <p:cSld>
+    <p:spTree>
+      <p:nvGrpSpPr>
+        <p:cNvPr id="1" name=""/>
+        <p:cNvGrpSpPr/>
+        <p:nvPr/>
+      </p:nvGrpSpPr>
+      <p:grpSpPr>
+        <a:xfrm>
+          <a:off x="0" y="0"/>
+          <a:ext cx="0" cy="0"/>
+          <a:chOff x="0" y="0"/>
+          <a:chExt cx="0" cy="0"/>
+        </a:xfrm>
+      </p:grpSpPr>
+      <p:sp>
+        <p:nvSpPr>
+          <p:cNvPr id="2" name="Slide Image Placeholder 1"/>
+          <p:cNvSpPr>
+            <a:spLocks noGrp="1" noRot="1" noChangeAspect="1"/>
+          </p:cNvSpPr>
+          <p:nvPr>
+            <p:ph type="sldImg"/>
+          </p:nvPr>
+        </p:nvSpPr>
+        <p:spPr/>
+      </p:sp>
+      <p:sp>
+        <p:nvSpPr>
+          <p:cNvPr id="3" name="Notes Placeholder 2"/>
+          <p:cNvSpPr>
+            <a:spLocks noGrp="1"/>
+          </p:cNvSpPr>
+          <p:nvPr>
+            <p:ph type="body" idx="1"/>
+          </p:nvPr>
+        </p:nvSpPr>
+        <p:spPr/>
+        <p:txBody>
+          <a:bodyPr>
+            <a:normAutofit/>
+          </a:bodyPr>
+          <a:lstStyle/>
+          <a:p>
+            <a:r>
+              <a:rPr lang="en-US" dirty="0" smtClean="0"/>
+              <a:t>The next simulation at 90% load reveals slightly better performance of PI algorithm. And as we can see all algorithms has degradation comparing to the uncongested network, which is an indication of actual congestion events. </a:t>
+            </a:r>
+          </a:p>
+          <a:p>
+            <a:endParaRPr lang="en-US" dirty="0"/>
+          </a:p>
+        </p:txBody>
+      </p:sp>
+      <p:sp>
+        <p:nvSpPr>
+          <p:cNvPr id="4" name="Slide Number Placeholder 3"/>
+          <p:cNvSpPr>
+            <a:spLocks noGrp="1"/>
+          </p:cNvSpPr>
+          <p:nvPr>
+            <p:ph type="sldNum" sz="quarter" idx="10"/>
+          </p:nvPr>
+        </p:nvSpPr>
+        <p:spPr/>
+        <p:txBody>
+          <a:bodyPr/>
+          <a:lstStyle/>
+          <a:p>
+            <a:fld id="{9EBEBA0C-0AD4-124C-BACA-15E282F741D9}" type="slidenum">
+              <a:rPr lang="en-US" smtClean="0"/>
+              <a:pPr/>
+              <a:t>14</a:t>
+            </a:fld>
+            <a:endParaRPr lang="en-US"/>
+          </a:p>
+        </p:txBody>
+      </p:sp>
+    </p:spTree>
+  </p:cSld>
+  <p:clrMapOvr>
+    <a:masterClrMapping/>
+  </p:clrMapOvr>
+</p:notes>
+</file>
+
+<file path=ppt/notesSlides/notesSlide14.xml><?xml version="1.0" encoding="utf-8"?>
+<p:notes xmlns:a="http://schemas.openxmlformats.org/drawingml/2006/main" xmlns:r="http://schemas.openxmlformats.org/officeDocument/2006/relationships" xmlns:mc="http://schemas.openxmlformats.org/markup-compatibility/2006" xmlns:mv="urn:schemas-microsoft-com:mac:vml" xmlns:p="http://schemas.openxmlformats.org/presentationml/2006/main" mc:Ignorable="mv" mc:PreserveAttributes="mv:*">
+  <p:cSld>
+    <p:spTree>
+      <p:nvGrpSpPr>
+        <p:cNvPr id="1" name=""/>
+        <p:cNvGrpSpPr/>
+        <p:nvPr/>
+      </p:nvGrpSpPr>
+      <p:grpSpPr>
+        <a:xfrm>
+          <a:off x="0" y="0"/>
+          <a:ext cx="0" cy="0"/>
+          <a:chOff x="0" y="0"/>
+          <a:chExt cx="0" cy="0"/>
+        </a:xfrm>
+      </p:grpSpPr>
+      <p:sp>
+        <p:nvSpPr>
+          <p:cNvPr id="2" name="Slide Image Placeholder 1"/>
+          <p:cNvSpPr>
+            <a:spLocks noGrp="1" noRot="1" noChangeAspect="1"/>
+          </p:cNvSpPr>
+          <p:nvPr>
+            <p:ph type="sldImg"/>
+          </p:nvPr>
+        </p:nvSpPr>
+        <p:spPr/>
+      </p:sp>
+      <p:sp>
+        <p:nvSpPr>
+          <p:cNvPr id="3" name="Notes Placeholder 2"/>
+          <p:cNvSpPr>
+            <a:spLocks noGrp="1"/>
+          </p:cNvSpPr>
+          <p:nvPr>
+            <p:ph type="body" idx="1"/>
+          </p:nvPr>
+        </p:nvSpPr>
+        <p:spPr/>
+        <p:txBody>
+          <a:bodyPr>
+            <a:normAutofit/>
+          </a:bodyPr>
+          <a:lstStyle/>
+          <a:p>
+            <a:r>
+              <a:rPr lang="en-US" dirty="0" smtClean="0"/>
+              <a:t>98% load decreases the response time of all queue managements algorithms. PI again performs better, but it need to be adjusted to new environment, and, actually, shows not really perfect results, comparing to PI and conventional FIFO.</a:t>
+            </a:r>
+            <a:endParaRPr lang="en-US" dirty="0"/>
+          </a:p>
+        </p:txBody>
+      </p:sp>
+      <p:sp>
+        <p:nvSpPr>
+          <p:cNvPr id="4" name="Slide Number Placeholder 3"/>
+          <p:cNvSpPr>
+            <a:spLocks noGrp="1"/>
+          </p:cNvSpPr>
+          <p:nvPr>
+            <p:ph type="sldNum" sz="quarter" idx="10"/>
+          </p:nvPr>
+        </p:nvSpPr>
+        <p:spPr/>
+        <p:txBody>
+          <a:bodyPr/>
+          <a:lstStyle/>
+          <a:p>
+            <a:fld id="{9EBEBA0C-0AD4-124C-BACA-15E282F741D9}" type="slidenum">
+              <a:rPr lang="en-US" smtClean="0"/>
+              <a:pPr/>
+              <a:t>15</a:t>
+            </a:fld>
+            <a:endParaRPr lang="en-US"/>
+          </a:p>
+        </p:txBody>
+      </p:sp>
+    </p:spTree>
+  </p:cSld>
+  <p:clrMapOvr>
+    <a:masterClrMapping/>
+  </p:clrMapOvr>
+</p:notes>
+</file>
+
+<file path=ppt/notesSlides/notesSlide15.xml><?xml version="1.0" encoding="utf-8"?>
+<p:notes xmlns:a="http://schemas.openxmlformats.org/drawingml/2006/main" xmlns:r="http://schemas.openxmlformats.org/officeDocument/2006/relationships" xmlns:mc="http://schemas.openxmlformats.org/markup-compatibility/2006" xmlns:mv="urn:schemas-microsoft-com:mac:vml" xmlns:p="http://schemas.openxmlformats.org/presentationml/2006/main" mc:Ignorable="mv" mc:PreserveAttributes="mv:*">
+  <p:cSld>
+    <p:spTree>
+      <p:nvGrpSpPr>
+        <p:cNvPr id="1" name=""/>
+        <p:cNvGrpSpPr/>
+        <p:nvPr/>
+      </p:nvGrpSpPr>
+      <p:grpSpPr>
+        <a:xfrm>
+          <a:off x="0" y="0"/>
+          <a:ext cx="0" cy="0"/>
+          <a:chOff x="0" y="0"/>
+          <a:chExt cx="0" cy="0"/>
+        </a:xfrm>
+      </p:grpSpPr>
+      <p:sp>
+        <p:nvSpPr>
+          <p:cNvPr id="2" name="Slide Image Placeholder 1"/>
+          <p:cNvSpPr>
+            <a:spLocks noGrp="1" noRot="1" noChangeAspect="1"/>
+          </p:cNvSpPr>
+          <p:nvPr>
+            <p:ph type="sldImg"/>
+          </p:nvPr>
+        </p:nvSpPr>
+        <p:spPr/>
+      </p:sp>
+      <p:sp>
+        <p:nvSpPr>
+          <p:cNvPr id="3" name="Notes Placeholder 2"/>
+          <p:cNvSpPr>
+            <a:spLocks noGrp="1"/>
+          </p:cNvSpPr>
+          <p:nvPr>
+            <p:ph type="body" idx="1"/>
+          </p:nvPr>
+        </p:nvSpPr>
+        <p:spPr/>
+        <p:txBody>
+          <a:bodyPr>
+            <a:normAutofit/>
+          </a:bodyPr>
+          <a:lstStyle/>
+          <a:p>
+            <a:r>
+              <a:rPr lang="en-US" dirty="0" smtClean="0"/>
+              <a:t>The results we just seen wasn't in a favor of </a:t>
+            </a:r>
+            <a:r>
+              <a:rPr lang="en-US" dirty="0" err="1" smtClean="0"/>
+              <a:t>AQMs</a:t>
+            </a:r>
+            <a:r>
+              <a:rPr lang="en-US" dirty="0" smtClean="0"/>
+              <a:t>. ARED performs very bed, PI and REM just slightly better. And the impact can be seen if link utilization is more than 80%, which is questionable frequently. </a:t>
+            </a:r>
+          </a:p>
+          <a:p>
+            <a:endParaRPr lang="en-US" dirty="0" smtClean="0"/>
+          </a:p>
+          <a:p>
+            <a:r>
+              <a:rPr lang="en-US" dirty="0" smtClean="0"/>
+              <a:t>Let's see results of the same experiments, but when primary signal is not a drop, but explicit signaling using ECN.</a:t>
+            </a:r>
+          </a:p>
+          <a:p>
+            <a:endParaRPr lang="en-US" dirty="0"/>
+          </a:p>
+        </p:txBody>
+      </p:sp>
+      <p:sp>
+        <p:nvSpPr>
+          <p:cNvPr id="4" name="Slide Number Placeholder 3"/>
+          <p:cNvSpPr>
+            <a:spLocks noGrp="1"/>
+          </p:cNvSpPr>
+          <p:nvPr>
+            <p:ph type="sldNum" sz="quarter" idx="10"/>
+          </p:nvPr>
+        </p:nvSpPr>
+        <p:spPr/>
+        <p:txBody>
+          <a:bodyPr/>
+          <a:lstStyle/>
+          <a:p>
+            <a:fld id="{9EBEBA0C-0AD4-124C-BACA-15E282F741D9}" type="slidenum">
+              <a:rPr lang="en-US" smtClean="0"/>
+              <a:pPr/>
+              <a:t>16</a:t>
+            </a:fld>
+            <a:endParaRPr lang="en-US"/>
+          </a:p>
+        </p:txBody>
+      </p:sp>
+    </p:spTree>
+  </p:cSld>
+  <p:clrMapOvr>
+    <a:masterClrMapping/>
+  </p:clrMapOvr>
+</p:notes>
+</file>
+
+<file path=ppt/notesSlides/notesSlide16.xml><?xml version="1.0" encoding="utf-8"?>
+<p:notes xmlns:a="http://schemas.openxmlformats.org/drawingml/2006/main" xmlns:r="http://schemas.openxmlformats.org/officeDocument/2006/relationships" xmlns:mc="http://schemas.openxmlformats.org/markup-compatibility/2006" xmlns:mv="urn:schemas-microsoft-com:mac:vml" xmlns:p="http://schemas.openxmlformats.org/presentationml/2006/main" mc:Ignorable="mv" mc:PreserveAttributes="mv:*">
+  <p:cSld>
+    <p:spTree>
+      <p:nvGrpSpPr>
+        <p:cNvPr id="1" name=""/>
+        <p:cNvGrpSpPr/>
+        <p:nvPr/>
+      </p:nvGrpSpPr>
+      <p:grpSpPr>
+        <a:xfrm>
+          <a:off x="0" y="0"/>
+          <a:ext cx="0" cy="0"/>
+          <a:chOff x="0" y="0"/>
+          <a:chExt cx="0" cy="0"/>
+        </a:xfrm>
+      </p:grpSpPr>
+      <p:sp>
+        <p:nvSpPr>
+          <p:cNvPr id="2" name="Slide Image Placeholder 1"/>
+          <p:cNvSpPr>
+            <a:spLocks noGrp="1" noRot="1" noChangeAspect="1"/>
+          </p:cNvSpPr>
+          <p:nvPr>
+            <p:ph type="sldImg"/>
+          </p:nvPr>
+        </p:nvSpPr>
+        <p:spPr/>
+      </p:sp>
+      <p:sp>
+        <p:nvSpPr>
+          <p:cNvPr id="3" name="Notes Placeholder 2"/>
+          <p:cNvSpPr>
+            <a:spLocks noGrp="1"/>
+          </p:cNvSpPr>
+          <p:nvPr>
+            <p:ph type="body" idx="1"/>
+          </p:nvPr>
+        </p:nvSpPr>
+        <p:spPr/>
+        <p:txBody>
+          <a:bodyPr>
+            <a:normAutofit/>
+          </a:bodyPr>
+          <a:lstStyle/>
+          <a:p>
+            <a:r>
+              <a:rPr lang="en-US" dirty="0" smtClean="0"/>
+              <a:t>REM, in its case, has substantial improvement if ECN is enabled. Moreover, the tuning parameters makes practically no difference, as it was without ECN. From the graph we can say, that 98% of request has been served within 1second</a:t>
+            </a:r>
+            <a:endParaRPr lang="en-US" dirty="0"/>
+          </a:p>
+        </p:txBody>
+      </p:sp>
+      <p:sp>
+        <p:nvSpPr>
+          <p:cNvPr id="4" name="Slide Number Placeholder 3"/>
+          <p:cNvSpPr>
+            <a:spLocks noGrp="1"/>
+          </p:cNvSpPr>
+          <p:nvPr>
+            <p:ph type="sldNum" sz="quarter" idx="10"/>
+          </p:nvPr>
+        </p:nvSpPr>
+        <p:spPr/>
+        <p:txBody>
+          <a:bodyPr/>
+          <a:lstStyle/>
+          <a:p>
+            <a:fld id="{9EBEBA0C-0AD4-124C-BACA-15E282F741D9}" type="slidenum">
+              <a:rPr lang="en-US" smtClean="0"/>
+              <a:pPr/>
+              <a:t>17</a:t>
+            </a:fld>
+            <a:endParaRPr lang="en-US"/>
+          </a:p>
+        </p:txBody>
+      </p:sp>
+    </p:spTree>
+  </p:cSld>
+  <p:clrMapOvr>
+    <a:masterClrMapping/>
+  </p:clrMapOvr>
+</p:notes>
+</file>
+
+<file path=ppt/notesSlides/notesSlide17.xml><?xml version="1.0" encoding="utf-8"?>
+<p:notes xmlns:a="http://schemas.openxmlformats.org/drawingml/2006/main" xmlns:r="http://schemas.openxmlformats.org/officeDocument/2006/relationships" xmlns:mc="http://schemas.openxmlformats.org/markup-compatibility/2006" xmlns:mv="urn:schemas-microsoft-com:mac:vml" xmlns:p="http://schemas.openxmlformats.org/presentationml/2006/main" mc:Ignorable="mv" mc:PreserveAttributes="mv:*">
+  <p:cSld>
+    <p:spTree>
+      <p:nvGrpSpPr>
+        <p:cNvPr id="1" name=""/>
+        <p:cNvGrpSpPr/>
+        <p:nvPr/>
+      </p:nvGrpSpPr>
+      <p:grpSpPr>
+        <a:xfrm>
+          <a:off x="0" y="0"/>
+          <a:ext cx="0" cy="0"/>
+          <a:chOff x="0" y="0"/>
+          <a:chExt cx="0" cy="0"/>
+        </a:xfrm>
+      </p:grpSpPr>
+      <p:sp>
+        <p:nvSpPr>
+          <p:cNvPr id="2" name="Slide Image Placeholder 1"/>
+          <p:cNvSpPr>
+            <a:spLocks noGrp="1" noRot="1" noChangeAspect="1"/>
+          </p:cNvSpPr>
+          <p:nvPr>
+            <p:ph type="sldImg"/>
+          </p:nvPr>
+        </p:nvSpPr>
+        <p:spPr/>
+      </p:sp>
+      <p:sp>
+        <p:nvSpPr>
+          <p:cNvPr id="3" name="Notes Placeholder 2"/>
+          <p:cNvSpPr>
+            <a:spLocks noGrp="1"/>
+          </p:cNvSpPr>
+          <p:nvPr>
+            <p:ph type="body" idx="1"/>
+          </p:nvPr>
+        </p:nvSpPr>
+        <p:spPr/>
+        <p:txBody>
+          <a:bodyPr>
+            <a:normAutofit/>
+          </a:bodyPr>
+          <a:lstStyle/>
+          <a:p>
+            <a:r>
+              <a:rPr lang="en-US" dirty="0" smtClean="0"/>
+              <a:t>The comparison to PI algorithm shows, that both has superior performance to FIFO algorithm and have very similar characteristics in a wide range of tuning parameters.</a:t>
+            </a:r>
+            <a:endParaRPr lang="en-US" dirty="0"/>
+          </a:p>
+        </p:txBody>
+      </p:sp>
+      <p:sp>
+        <p:nvSpPr>
+          <p:cNvPr id="4" name="Slide Number Placeholder 3"/>
+          <p:cNvSpPr>
+            <a:spLocks noGrp="1"/>
+          </p:cNvSpPr>
+          <p:nvPr>
+            <p:ph type="sldNum" sz="quarter" idx="10"/>
+          </p:nvPr>
+        </p:nvSpPr>
+        <p:spPr/>
+        <p:txBody>
+          <a:bodyPr/>
+          <a:lstStyle/>
+          <a:p>
+            <a:fld id="{9EBEBA0C-0AD4-124C-BACA-15E282F741D9}" type="slidenum">
+              <a:rPr lang="en-US" smtClean="0"/>
+              <a:pPr/>
+              <a:t>18</a:t>
+            </a:fld>
+            <a:endParaRPr lang="en-US"/>
+          </a:p>
+        </p:txBody>
+      </p:sp>
+    </p:spTree>
+  </p:cSld>
+  <p:clrMapOvr>
+    <a:masterClrMapping/>
+  </p:clrMapOvr>
+</p:notes>
+</file>
+
+<file path=ppt/notesSlides/notesSlide18.xml><?xml version="1.0" encoding="utf-8"?>
+<p:notes xmlns:a="http://schemas.openxmlformats.org/drawingml/2006/main" xmlns:r="http://schemas.openxmlformats.org/officeDocument/2006/relationships" xmlns:mc="http://schemas.openxmlformats.org/markup-compatibility/2006" xmlns:mv="urn:schemas-microsoft-com:mac:vml" xmlns:p="http://schemas.openxmlformats.org/presentationml/2006/main" mc:Ignorable="mv" mc:PreserveAttributes="mv:*">
+  <p:cSld>
+    <p:spTree>
+      <p:nvGrpSpPr>
+        <p:cNvPr id="1" name=""/>
+        <p:cNvGrpSpPr/>
+        <p:nvPr/>
+      </p:nvGrpSpPr>
+      <p:grpSpPr>
+        <a:xfrm>
+          <a:off x="0" y="0"/>
+          <a:ext cx="0" cy="0"/>
+          <a:chOff x="0" y="0"/>
+          <a:chExt cx="0" cy="0"/>
+        </a:xfrm>
+      </p:grpSpPr>
+      <p:sp>
+        <p:nvSpPr>
+          <p:cNvPr id="2" name="Slide Image Placeholder 1"/>
+          <p:cNvSpPr>
+            <a:spLocks noGrp="1" noRot="1" noChangeAspect="1"/>
+          </p:cNvSpPr>
+          <p:nvPr>
+            <p:ph type="sldImg"/>
+          </p:nvPr>
+        </p:nvSpPr>
+        <p:spPr/>
+      </p:sp>
+      <p:sp>
+        <p:nvSpPr>
+          <p:cNvPr id="3" name="Notes Placeholder 2"/>
+          <p:cNvSpPr>
+            <a:spLocks noGrp="1"/>
+          </p:cNvSpPr>
+          <p:nvPr>
+            <p:ph type="body" idx="1"/>
+          </p:nvPr>
+        </p:nvSpPr>
+        <p:spPr/>
+        <p:txBody>
+          <a:bodyPr>
+            <a:normAutofit/>
+          </a:bodyPr>
+          <a:lstStyle/>
+          <a:p>
+            <a:r>
+              <a:rPr lang="en-US" dirty="0" smtClean="0"/>
+              <a:t>As we can see, enabling ECN has practically no impact on ARED. On of the possible explanation, presented in the paper was that during the congestion event ECN packets has the same probability to be lost as DATA packets (prevention of selfish behavior). That's, their ARED implementation is counting probability on packet basis, not on byte basis.</a:t>
+            </a:r>
+            <a:endParaRPr lang="en-US" dirty="0"/>
+          </a:p>
+        </p:txBody>
+      </p:sp>
+      <p:sp>
+        <p:nvSpPr>
+          <p:cNvPr id="4" name="Slide Number Placeholder 3"/>
+          <p:cNvSpPr>
+            <a:spLocks noGrp="1"/>
+          </p:cNvSpPr>
+          <p:nvPr>
+            <p:ph type="sldNum" sz="quarter" idx="10"/>
+          </p:nvPr>
+        </p:nvSpPr>
+        <p:spPr/>
+        <p:txBody>
+          <a:bodyPr/>
+          <a:lstStyle/>
+          <a:p>
+            <a:fld id="{9EBEBA0C-0AD4-124C-BACA-15E282F741D9}" type="slidenum">
+              <a:rPr lang="en-US" smtClean="0"/>
+              <a:pPr/>
+              <a:t>19</a:t>
+            </a:fld>
+            <a:endParaRPr lang="en-US"/>
+          </a:p>
+        </p:txBody>
+      </p:sp>
+    </p:spTree>
+  </p:cSld>
+  <p:clrMapOvr>
+    <a:masterClrMapping/>
+  </p:clrMapOvr>
+</p:notes>
+</file>
+
+<file path=ppt/notesSlides/notesSlide19.xml><?xml version="1.0" encoding="utf-8"?>
+<p:notes xmlns:a="http://schemas.openxmlformats.org/drawingml/2006/main" xmlns:r="http://schemas.openxmlformats.org/officeDocument/2006/relationships" xmlns:mc="http://schemas.openxmlformats.org/markup-compatibility/2006" xmlns:mv="urn:schemas-microsoft-com:mac:vml" xmlns:p="http://schemas.openxmlformats.org/presentationml/2006/main" mc:Ignorable="mv" mc:PreserveAttributes="mv:*">
+  <p:cSld>
+    <p:spTree>
+      <p:nvGrpSpPr>
+        <p:cNvPr id="1" name=""/>
+        <p:cNvGrpSpPr/>
+        <p:nvPr/>
+      </p:nvGrpSpPr>
+      <p:grpSpPr>
+        <a:xfrm>
+          <a:off x="0" y="0"/>
+          <a:ext cx="0" cy="0"/>
+          <a:chOff x="0" y="0"/>
+          <a:chExt cx="0" cy="0"/>
+        </a:xfrm>
+      </p:grpSpPr>
+      <p:sp>
+        <p:nvSpPr>
+          <p:cNvPr id="2" name="Slide Image Placeholder 1"/>
+          <p:cNvSpPr>
+            <a:spLocks noGrp="1" noRot="1" noChangeAspect="1"/>
+          </p:cNvSpPr>
+          <p:nvPr>
+            <p:ph type="sldImg"/>
+          </p:nvPr>
+        </p:nvSpPr>
+        <p:spPr/>
+      </p:sp>
+      <p:sp>
+        <p:nvSpPr>
+          <p:cNvPr id="3" name="Notes Placeholder 2"/>
+          <p:cNvSpPr>
+            <a:spLocks noGrp="1"/>
+          </p:cNvSpPr>
+          <p:nvPr>
+            <p:ph type="body" idx="1"/>
+          </p:nvPr>
+        </p:nvSpPr>
+        <p:spPr/>
+        <p:txBody>
+          <a:bodyPr>
+            <a:normAutofit/>
+          </a:bodyPr>
+          <a:lstStyle/>
+          <a:p>
+            <a:r>
+              <a:rPr lang="en-US" dirty="0" smtClean="0"/>
+              <a:t>On of the possible explanation, presented in the paper was that during the congestion event ECN packets has the same probability to be lost as DATA packets (prevention of selfish behavior). That's, their ARED implementation is counting probability on packet basis, not on byte basis.</a:t>
+            </a:r>
+          </a:p>
+          <a:p>
+            <a:r>
+              <a:rPr lang="en-US" dirty="0" smtClean="0"/>
+              <a:t>Another point is that weighted queue length used in ARED can not effectively reflect the real situation.</a:t>
+            </a:r>
+          </a:p>
+          <a:p>
+            <a:endParaRPr lang="en-US" dirty="0"/>
+          </a:p>
+        </p:txBody>
+      </p:sp>
+      <p:sp>
+        <p:nvSpPr>
+          <p:cNvPr id="4" name="Slide Number Placeholder 3"/>
+          <p:cNvSpPr>
+            <a:spLocks noGrp="1"/>
+          </p:cNvSpPr>
+          <p:nvPr>
+            <p:ph type="sldNum" sz="quarter" idx="10"/>
+          </p:nvPr>
+        </p:nvSpPr>
+        <p:spPr/>
+        <p:txBody>
+          <a:bodyPr/>
+          <a:lstStyle/>
+          <a:p>
+            <a:fld id="{9EBEBA0C-0AD4-124C-BACA-15E282F741D9}" type="slidenum">
+              <a:rPr lang="en-US" smtClean="0"/>
+              <a:pPr/>
+              <a:t>20</a:t>
+            </a:fld>
+            <a:endParaRPr lang="en-US"/>
+          </a:p>
+        </p:txBody>
+      </p:sp>
+    </p:spTree>
+  </p:cSld>
+  <p:clrMapOvr>
+    <a:masterClrMapping/>
+  </p:clrMapOvr>
+</p:notes>
+</file>
+
+<file path=ppt/notesSlides/notesSlide2.xml><?xml version="1.0" encoding="utf-8"?>
+<p:notes xmlns:a="http://schemas.openxmlformats.org/drawingml/2006/main" xmlns:r="http://schemas.openxmlformats.org/officeDocument/2006/relationships" xmlns:mc="http://schemas.openxmlformats.org/markup-compatibility/2006" xmlns:mv="urn:schemas-microsoft-com:mac:vml" xmlns:p="http://schemas.openxmlformats.org/presentationml/2006/main" mc:Ignorable="mv" mc:PreserveAttributes="mv:*">
+  <p:cSld>
+    <p:spTree>
+      <p:nvGrpSpPr>
+        <p:cNvPr id="1" name=""/>
+        <p:cNvGrpSpPr/>
+        <p:nvPr/>
+      </p:nvGrpSpPr>
+      <p:grpSpPr>
+        <a:xfrm>
+          <a:off x="0" y="0"/>
+          <a:ext cx="0" cy="0"/>
+          <a:chOff x="0" y="0"/>
+          <a:chExt cx="0" cy="0"/>
+        </a:xfrm>
+      </p:grpSpPr>
+      <p:sp>
+        <p:nvSpPr>
+          <p:cNvPr id="2" name="Slide Image Placeholder 1"/>
+          <p:cNvSpPr>
+            <a:spLocks noGrp="1" noRot="1" noChangeAspect="1"/>
+          </p:cNvSpPr>
+          <p:nvPr>
+            <p:ph type="sldImg"/>
+          </p:nvPr>
+        </p:nvSpPr>
+        <p:spPr/>
+      </p:sp>
+      <p:sp>
+        <p:nvSpPr>
+          <p:cNvPr id="3" name="Notes Placeholder 2"/>
+          <p:cNvSpPr>
+            <a:spLocks noGrp="1"/>
+          </p:cNvSpPr>
+          <p:nvPr>
+            <p:ph type="body" idx="1"/>
+          </p:nvPr>
+        </p:nvSpPr>
+        <p:spPr/>
+        <p:txBody>
+          <a:bodyPr>
+            <a:normAutofit/>
+          </a:bodyPr>
+          <a:lstStyle/>
+          <a:p>
+            <a:r>
+              <a:rPr lang="en-US" dirty="0" smtClean="0"/>
+              <a:t>So. Let's start from the basic questions. </a:t>
+            </a:r>
+          </a:p>
+          <a:p>
+            <a:r>
+              <a:rPr lang="en-US" dirty="0" smtClean="0"/>
+              <a:t>_Is something wrong with routing performance?_ Yes and no. Yes, because there are number problems caused by conventional FIFO buffer management. No, because the problems occur only if channels are working near their capacity limit, what is unlike situation for ISP. But anyways, in some environments, AQM can improve performance. </a:t>
+            </a:r>
+          </a:p>
+          <a:p>
+            <a:r>
+              <a:rPr lang="en-US" dirty="0" smtClean="0"/>
+              <a:t>_Is AQM available?_ Again Yes and No. There are dozen of algorithms, but neither was proven to work perfectly, neither was actually deployed (enabled by default). We will briefly go over three AQM algorithms - Adaptive RED, Proportional Integrator and Random Exponential Marking.</a:t>
+            </a:r>
+          </a:p>
+          <a:p>
+            <a:r>
+              <a:rPr lang="en-US" dirty="0" smtClean="0"/>
+              <a:t>_Does the AQM really help?_ Same Yes and No answer. We can always find the network environment where AQM is superior to FIFO and always can find a counter environment characteristics. As we can see later, in particular environments, the Web traffic can, depending on algorithm, benefit or from AQM rules.</a:t>
+            </a:r>
+            <a:endParaRPr lang="en-US" dirty="0"/>
+          </a:p>
+        </p:txBody>
+      </p:sp>
+      <p:sp>
+        <p:nvSpPr>
+          <p:cNvPr id="4" name="Slide Number Placeholder 3"/>
+          <p:cNvSpPr>
+            <a:spLocks noGrp="1"/>
+          </p:cNvSpPr>
+          <p:nvPr>
+            <p:ph type="sldNum" sz="quarter" idx="10"/>
+          </p:nvPr>
+        </p:nvSpPr>
+        <p:spPr/>
+        <p:txBody>
+          <a:bodyPr/>
+          <a:lstStyle/>
+          <a:p>
+            <a:fld id="{9EBEBA0C-0AD4-124C-BACA-15E282F741D9}" type="slidenum">
+              <a:rPr lang="en-US" smtClean="0"/>
+              <a:pPr/>
+              <a:t>2</a:t>
+            </a:fld>
+            <a:endParaRPr lang="en-US"/>
+          </a:p>
+        </p:txBody>
+      </p:sp>
+    </p:spTree>
+  </p:cSld>
+  <p:clrMapOvr>
+    <a:masterClrMapping/>
+  </p:clrMapOvr>
+</p:notes>
+</file>
+
+<file path=ppt/notesSlides/notesSlide20.xml><?xml version="1.0" encoding="utf-8"?>
+<p:notes xmlns:a="http://schemas.openxmlformats.org/drawingml/2006/main" xmlns:r="http://schemas.openxmlformats.org/officeDocument/2006/relationships" xmlns:mc="http://schemas.openxmlformats.org/markup-compatibility/2006" xmlns:mv="urn:schemas-microsoft-com:mac:vml" xmlns:p="http://schemas.openxmlformats.org/presentationml/2006/main" mc:Ignorable="mv" mc:PreserveAttributes="mv:*">
+  <p:cSld>
+    <p:spTree>
+      <p:nvGrpSpPr>
+        <p:cNvPr id="1" name=""/>
+        <p:cNvGrpSpPr/>
+        <p:nvPr/>
+      </p:nvGrpSpPr>
+      <p:grpSpPr>
+        <a:xfrm>
+          <a:off x="0" y="0"/>
+          <a:ext cx="0" cy="0"/>
+          <a:chOff x="0" y="0"/>
+          <a:chExt cx="0" cy="0"/>
+        </a:xfrm>
+      </p:grpSpPr>
+      <p:sp>
+        <p:nvSpPr>
+          <p:cNvPr id="2" name="Slide Image Placeholder 1"/>
+          <p:cNvSpPr>
+            <a:spLocks noGrp="1" noRot="1" noChangeAspect="1"/>
+          </p:cNvSpPr>
+          <p:nvPr>
+            <p:ph type="sldImg"/>
+          </p:nvPr>
+        </p:nvSpPr>
+        <p:spPr/>
+      </p:sp>
+      <p:sp>
+        <p:nvSpPr>
+          <p:cNvPr id="3" name="Notes Placeholder 2"/>
+          <p:cNvSpPr>
+            <a:spLocks noGrp="1"/>
+          </p:cNvSpPr>
+          <p:nvPr>
+            <p:ph type="body" idx="1"/>
+          </p:nvPr>
+        </p:nvSpPr>
+        <p:spPr/>
+        <p:txBody>
+          <a:bodyPr>
+            <a:normAutofit/>
+          </a:bodyPr>
+          <a:lstStyle/>
+          <a:p>
+            <a:r>
+              <a:rPr lang="en-US" dirty="0" smtClean="0"/>
+              <a:t>Paper conclusion</a:t>
+            </a:r>
+            <a:endParaRPr lang="en-US" dirty="0"/>
+          </a:p>
+        </p:txBody>
+      </p:sp>
+      <p:sp>
+        <p:nvSpPr>
+          <p:cNvPr id="4" name="Slide Number Placeholder 3"/>
+          <p:cNvSpPr>
+            <a:spLocks noGrp="1"/>
+          </p:cNvSpPr>
+          <p:nvPr>
+            <p:ph type="sldNum" sz="quarter" idx="10"/>
+          </p:nvPr>
+        </p:nvSpPr>
+        <p:spPr/>
+        <p:txBody>
+          <a:bodyPr/>
+          <a:lstStyle/>
+          <a:p>
+            <a:fld id="{9EBEBA0C-0AD4-124C-BACA-15E282F741D9}" type="slidenum">
+              <a:rPr lang="en-US" smtClean="0"/>
+              <a:pPr/>
+              <a:t>21</a:t>
+            </a:fld>
+            <a:endParaRPr lang="en-US"/>
+          </a:p>
+        </p:txBody>
+      </p:sp>
+    </p:spTree>
+  </p:cSld>
+  <p:clrMapOvr>
+    <a:masterClrMapping/>
+  </p:clrMapOvr>
+</p:notes>
+</file>
+
+<file path=ppt/notesSlides/notesSlide21.xml><?xml version="1.0" encoding="utf-8"?>
+<p:notes xmlns:a="http://schemas.openxmlformats.org/drawingml/2006/main" xmlns:r="http://schemas.openxmlformats.org/officeDocument/2006/relationships" xmlns:mc="http://schemas.openxmlformats.org/markup-compatibility/2006" xmlns:mv="urn:schemas-microsoft-com:mac:vml" xmlns:p="http://schemas.openxmlformats.org/presentationml/2006/main" mc:Ignorable="mv" mc:PreserveAttributes="mv:*">
+  <p:cSld>
+    <p:spTree>
+      <p:nvGrpSpPr>
+        <p:cNvPr id="1" name=""/>
+        <p:cNvGrpSpPr/>
+        <p:nvPr/>
+      </p:nvGrpSpPr>
+      <p:grpSpPr>
+        <a:xfrm>
+          <a:off x="0" y="0"/>
+          <a:ext cx="0" cy="0"/>
+          <a:chOff x="0" y="0"/>
+          <a:chExt cx="0" cy="0"/>
+        </a:xfrm>
+      </p:grpSpPr>
+      <p:sp>
+        <p:nvSpPr>
+          <p:cNvPr id="2" name="Slide Image Placeholder 1"/>
+          <p:cNvSpPr>
+            <a:spLocks noGrp="1" noRot="1" noChangeAspect="1"/>
+          </p:cNvSpPr>
+          <p:nvPr>
+            <p:ph type="sldImg"/>
+          </p:nvPr>
+        </p:nvSpPr>
+        <p:spPr/>
+      </p:sp>
+      <p:sp>
+        <p:nvSpPr>
+          <p:cNvPr id="3" name="Notes Placeholder 2"/>
+          <p:cNvSpPr>
+            <a:spLocks noGrp="1"/>
+          </p:cNvSpPr>
+          <p:nvPr>
+            <p:ph type="body" idx="1"/>
+          </p:nvPr>
+        </p:nvSpPr>
+        <p:spPr/>
+        <p:txBody>
+          <a:bodyPr>
+            <a:normAutofit/>
+          </a:bodyPr>
+          <a:lstStyle/>
+          <a:p>
+            <a:r>
+              <a:rPr lang="en-US" dirty="0" smtClean="0"/>
+              <a:t>Paper conclusion</a:t>
+            </a:r>
+            <a:endParaRPr lang="en-US" dirty="0"/>
+          </a:p>
+        </p:txBody>
+      </p:sp>
+      <p:sp>
+        <p:nvSpPr>
+          <p:cNvPr id="4" name="Slide Number Placeholder 3"/>
+          <p:cNvSpPr>
+            <a:spLocks noGrp="1"/>
+          </p:cNvSpPr>
+          <p:nvPr>
+            <p:ph type="sldNum" sz="quarter" idx="10"/>
+          </p:nvPr>
+        </p:nvSpPr>
+        <p:spPr/>
+        <p:txBody>
+          <a:bodyPr/>
+          <a:lstStyle/>
+          <a:p>
+            <a:fld id="{9EBEBA0C-0AD4-124C-BACA-15E282F741D9}" type="slidenum">
+              <a:rPr lang="en-US" smtClean="0"/>
+              <a:pPr/>
+              <a:t>22</a:t>
+            </a:fld>
+            <a:endParaRPr lang="en-US"/>
+          </a:p>
+        </p:txBody>
+      </p:sp>
+    </p:spTree>
+  </p:cSld>
+  <p:clrMapOvr>
+    <a:masterClrMapping/>
+  </p:clrMapOvr>
+</p:notes>
+</file>
+
+<file path=ppt/notesSlides/notesSlide22.xml><?xml version="1.0" encoding="utf-8"?>
+<p:notes xmlns:a="http://schemas.openxmlformats.org/drawingml/2006/main" xmlns:r="http://schemas.openxmlformats.org/officeDocument/2006/relationships" xmlns:mc="http://schemas.openxmlformats.org/markup-compatibility/2006" xmlns:mv="urn:schemas-microsoft-com:mac:vml" xmlns:p="http://schemas.openxmlformats.org/presentationml/2006/main" mc:Ignorable="mv" mc:PreserveAttributes="mv:*">
+  <p:cSld>
+    <p:spTree>
+      <p:nvGrpSpPr>
+        <p:cNvPr id="1" name=""/>
+        <p:cNvGrpSpPr/>
+        <p:nvPr/>
+      </p:nvGrpSpPr>
+      <p:grpSpPr>
+        <a:xfrm>
+          <a:off x="0" y="0"/>
+          <a:ext cx="0" cy="0"/>
+          <a:chOff x="0" y="0"/>
+          <a:chExt cx="0" cy="0"/>
+        </a:xfrm>
+      </p:grpSpPr>
+      <p:sp>
+        <p:nvSpPr>
+          <p:cNvPr id="2" name="Slide Image Placeholder 1"/>
+          <p:cNvSpPr>
+            <a:spLocks noGrp="1" noRot="1" noChangeAspect="1"/>
+          </p:cNvSpPr>
+          <p:nvPr>
+            <p:ph type="sldImg"/>
+          </p:nvPr>
+        </p:nvSpPr>
+        <p:spPr/>
+      </p:sp>
+      <p:sp>
+        <p:nvSpPr>
+          <p:cNvPr id="3" name="Notes Placeholder 2"/>
+          <p:cNvSpPr>
+            <a:spLocks noGrp="1"/>
+          </p:cNvSpPr>
+          <p:nvPr>
+            <p:ph type="body" idx="1"/>
+          </p:nvPr>
+        </p:nvSpPr>
+        <p:spPr/>
+        <p:txBody>
+          <a:bodyPr>
+            <a:normAutofit/>
+          </a:bodyPr>
+          <a:lstStyle/>
+          <a:p>
+            <a:r>
+              <a:rPr lang="en-US" dirty="0" smtClean="0"/>
+              <a:t>What should we get from the evaluation? </a:t>
+            </a:r>
+          </a:p>
+          <a:p>
+            <a:r>
+              <a:rPr lang="en-US" dirty="0" smtClean="0"/>
+              <a:t>AQM can have positive impact on network performance? Yes</a:t>
+            </a:r>
+          </a:p>
+          <a:p>
+            <a:r>
+              <a:rPr lang="en-US" dirty="0" smtClean="0"/>
+              <a:t>ECN can substantially improve performance? Also yes.</a:t>
+            </a:r>
+          </a:p>
+          <a:p>
+            <a:endParaRPr lang="en-US" dirty="0" smtClean="0"/>
+          </a:p>
+          <a:p>
+            <a:r>
+              <a:rPr lang="en-US" dirty="0" smtClean="0"/>
+              <a:t>Are the conclusion definite? Absolutely No.</a:t>
+            </a:r>
+          </a:p>
+          <a:p>
+            <a:r>
+              <a:rPr lang="en-US" dirty="0" smtClean="0"/>
+              <a:t>They consider only Synthetic and only WEB traffic. However WEB is one of the popular applications, it is not the only one, and of course, not the most traffic generating application.</a:t>
+            </a:r>
+          </a:p>
+          <a:p>
+            <a:r>
+              <a:rPr lang="en-US" dirty="0" smtClean="0"/>
+              <a:t>UDP and non TCP-friendly (flows without congestion control) would have big impact on the final results.</a:t>
+            </a:r>
+          </a:p>
+          <a:p>
+            <a:r>
+              <a:rPr lang="en-US" dirty="0" smtClean="0"/>
+              <a:t>Flow fairness wasn't considered as a part of the evaluation</a:t>
+            </a:r>
+          </a:p>
+          <a:p>
+            <a:endParaRPr lang="en-US" dirty="0" smtClean="0"/>
+          </a:p>
+          <a:p>
+            <a:r>
+              <a:rPr lang="en-US" dirty="0" smtClean="0"/>
+              <a:t>But the most importantly, they consider only a standard TCP congestion control implementation in the environment, which is known to be not very suitable for it, especially for short connections like TCP.</a:t>
+            </a:r>
+          </a:p>
+          <a:p>
+            <a:endParaRPr lang="en-US" dirty="0"/>
+          </a:p>
+        </p:txBody>
+      </p:sp>
+      <p:sp>
+        <p:nvSpPr>
+          <p:cNvPr id="4" name="Slide Number Placeholder 3"/>
+          <p:cNvSpPr>
+            <a:spLocks noGrp="1"/>
+          </p:cNvSpPr>
+          <p:nvPr>
+            <p:ph type="sldNum" sz="quarter" idx="10"/>
+          </p:nvPr>
+        </p:nvSpPr>
+        <p:spPr/>
+        <p:txBody>
+          <a:bodyPr/>
+          <a:lstStyle/>
+          <a:p>
+            <a:fld id="{9EBEBA0C-0AD4-124C-BACA-15E282F741D9}" type="slidenum">
+              <a:rPr lang="en-US" smtClean="0"/>
+              <a:pPr/>
+              <a:t>23</a:t>
+            </a:fld>
+            <a:endParaRPr lang="en-US"/>
+          </a:p>
+        </p:txBody>
+      </p:sp>
+    </p:spTree>
+  </p:cSld>
+  <p:clrMapOvr>
+    <a:masterClrMapping/>
+  </p:clrMapOvr>
+</p:notes>
+</file>
+
+<file path=ppt/notesSlides/notesSlide3.xml><?xml version="1.0" encoding="utf-8"?>
+<p:notes xmlns:a="http://schemas.openxmlformats.org/drawingml/2006/main" xmlns:r="http://schemas.openxmlformats.org/officeDocument/2006/relationships" xmlns:mc="http://schemas.openxmlformats.org/markup-compatibility/2006" xmlns:mv="urn:schemas-microsoft-com:mac:vml" xmlns:p="http://schemas.openxmlformats.org/presentationml/2006/main" mc:Ignorable="mv" mc:PreserveAttributes="mv:*">
+  <p:cSld>
+    <p:spTree>
+      <p:nvGrpSpPr>
+        <p:cNvPr id="1" name=""/>
+        <p:cNvGrpSpPr/>
+        <p:nvPr/>
+      </p:nvGrpSpPr>
+      <p:grpSpPr>
+        <a:xfrm>
+          <a:off x="0" y="0"/>
+          <a:ext cx="0" cy="0"/>
+          <a:chOff x="0" y="0"/>
+          <a:chExt cx="0" cy="0"/>
+        </a:xfrm>
+      </p:grpSpPr>
+      <p:sp>
+        <p:nvSpPr>
+          <p:cNvPr id="2" name="Slide Image Placeholder 1"/>
+          <p:cNvSpPr>
+            <a:spLocks noGrp="1" noRot="1" noChangeAspect="1"/>
+          </p:cNvSpPr>
+          <p:nvPr>
+            <p:ph type="sldImg"/>
+          </p:nvPr>
+        </p:nvSpPr>
+        <p:spPr/>
+      </p:sp>
+      <p:sp>
+        <p:nvSpPr>
+          <p:cNvPr id="3" name="Notes Placeholder 2"/>
+          <p:cNvSpPr>
+            <a:spLocks noGrp="1"/>
+          </p:cNvSpPr>
+          <p:nvPr>
+            <p:ph type="body" idx="1"/>
+          </p:nvPr>
+        </p:nvSpPr>
+        <p:spPr/>
+        <p:txBody>
+          <a:bodyPr>
+            <a:normAutofit/>
+          </a:bodyPr>
+          <a:lstStyle/>
+          <a:p>
+            <a:r>
+              <a:rPr lang="en-US" b="1" dirty="0" smtClean="0"/>
+              <a:t>How bad is FIFO? </a:t>
+            </a:r>
+            <a:r>
+              <a:rPr lang="en-US" dirty="0" smtClean="0"/>
+              <a:t>On of the main disadvantages of FIFO is not directly connected to FIFO itself. The most of TCP congestion control algorithms relies on packet loss as a primary (and sometimes the one) signaling mechanism to infer about network state. FIFO drops only if queue overflows, which means a lot of drops can be done at the same time, which may lead to TCP flow synchronization, which may lead to channel load fluctuation and serious underutilization. </a:t>
+            </a:r>
+          </a:p>
+          <a:p>
+            <a:r>
+              <a:rPr lang="en-US" dirty="0" smtClean="0"/>
+              <a:t>Another problem caused by TCP congestion control algorithms is tendency to keep high level of buffering. This means increased response time for every request and potentially can increase level of jitter in RTT measurements.</a:t>
+            </a:r>
+          </a:p>
+          <a:p>
+            <a:r>
+              <a:rPr lang="en-US" dirty="0" smtClean="0"/>
+              <a:t>The recognized best practice is to have queue size at the router as a 2-4 times per average bandwidth delay product (i.e., channel capacity multiplied by average propagation delay of all passing flows). </a:t>
+            </a:r>
+          </a:p>
+          <a:p>
+            <a:r>
+              <a:rPr lang="en-US" dirty="0" smtClean="0"/>
+              <a:t>One more problem is fairness problem. Selfish flows can usurp the bottleneck by sending a lot of data - keeping the queue at the saturation point. This causes all other data to be dropped upon arrival.</a:t>
+            </a:r>
+            <a:endParaRPr lang="en-US" dirty="0"/>
+          </a:p>
+        </p:txBody>
+      </p:sp>
+      <p:sp>
+        <p:nvSpPr>
+          <p:cNvPr id="4" name="Slide Number Placeholder 3"/>
+          <p:cNvSpPr>
+            <a:spLocks noGrp="1"/>
+          </p:cNvSpPr>
+          <p:nvPr>
+            <p:ph type="sldNum" sz="quarter" idx="10"/>
+          </p:nvPr>
+        </p:nvSpPr>
+        <p:spPr/>
+        <p:txBody>
+          <a:bodyPr/>
+          <a:lstStyle/>
+          <a:p>
+            <a:fld id="{9EBEBA0C-0AD4-124C-BACA-15E282F741D9}" type="slidenum">
+              <a:rPr lang="en-US" smtClean="0"/>
+              <a:pPr/>
+              <a:t>3</a:t>
+            </a:fld>
+            <a:endParaRPr lang="en-US"/>
+          </a:p>
+        </p:txBody>
+      </p:sp>
+    </p:spTree>
+  </p:cSld>
+  <p:clrMapOvr>
+    <a:masterClrMapping/>
+  </p:clrMapOvr>
+</p:notes>
+</file>
+
+<file path=ppt/notesSlides/notesSlide4.xml><?xml version="1.0" encoding="utf-8"?>
+<p:notes xmlns:a="http://schemas.openxmlformats.org/drawingml/2006/main" xmlns:r="http://schemas.openxmlformats.org/officeDocument/2006/relationships" xmlns:mc="http://schemas.openxmlformats.org/markup-compatibility/2006" xmlns:mv="urn:schemas-microsoft-com:mac:vml" xmlns:p="http://schemas.openxmlformats.org/presentationml/2006/main" mc:Ignorable="mv" mc:PreserveAttributes="mv:*">
+  <p:cSld>
+    <p:spTree>
+      <p:nvGrpSpPr>
+        <p:cNvPr id="1" name=""/>
+        <p:cNvGrpSpPr/>
+        <p:nvPr/>
+      </p:nvGrpSpPr>
+      <p:grpSpPr>
+        <a:xfrm>
+          <a:off x="0" y="0"/>
+          <a:ext cx="0" cy="0"/>
+          <a:chOff x="0" y="0"/>
+          <a:chExt cx="0" cy="0"/>
+        </a:xfrm>
+      </p:grpSpPr>
+      <p:sp>
+        <p:nvSpPr>
+          <p:cNvPr id="2" name="Slide Image Placeholder 1"/>
+          <p:cNvSpPr>
+            <a:spLocks noGrp="1" noRot="1" noChangeAspect="1"/>
+          </p:cNvSpPr>
+          <p:nvPr>
+            <p:ph type="sldImg"/>
+          </p:nvPr>
+        </p:nvSpPr>
+        <p:spPr/>
+      </p:sp>
+      <p:sp>
+        <p:nvSpPr>
+          <p:cNvPr id="3" name="Notes Placeholder 2"/>
+          <p:cNvSpPr>
+            <a:spLocks noGrp="1"/>
+          </p:cNvSpPr>
+          <p:nvPr>
+            <p:ph type="body" idx="1"/>
+          </p:nvPr>
+        </p:nvSpPr>
+        <p:spPr/>
+        <p:txBody>
+          <a:bodyPr>
+            <a:normAutofit/>
+          </a:bodyPr>
+          <a:lstStyle/>
+          <a:p>
+            <a:r>
+              <a:rPr lang="en-US" dirty="0" smtClean="0"/>
+              <a:t>OK. Let's assume FIFO is bad. Can AQM provide us a simple and universal solution? Certainly, AQM is performed on routers which know exact information about its queue states. But how this information can be employed? Does router need to consider congestion when queue contain non zero amount of packets? Or there is some threshold below which </a:t>
+            </a:r>
+            <a:r>
+              <a:rPr lang="en-US" dirty="0" err="1" smtClean="0"/>
+              <a:t>queueing</a:t>
+            </a:r>
+            <a:r>
+              <a:rPr lang="en-US" dirty="0" smtClean="0"/>
+              <a:t> is allowed? Other, no less interesting question, is how AQM should react if congestion is detected? Drop old? Drop new? Random drop? Maybe just mark and hope that sender will eventually decrease a sending rate? </a:t>
+            </a:r>
+          </a:p>
+          <a:p>
+            <a:r>
+              <a:rPr lang="en-US" dirty="0" smtClean="0"/>
+              <a:t>There are no definite answers on these questions. As a result, we have a dozen of different AQM approaches </a:t>
+            </a:r>
+            <a:endParaRPr lang="en-US" dirty="0"/>
+          </a:p>
+        </p:txBody>
+      </p:sp>
+      <p:sp>
+        <p:nvSpPr>
+          <p:cNvPr id="4" name="Slide Number Placeholder 3"/>
+          <p:cNvSpPr>
+            <a:spLocks noGrp="1"/>
+          </p:cNvSpPr>
+          <p:nvPr>
+            <p:ph type="sldNum" sz="quarter" idx="10"/>
+          </p:nvPr>
+        </p:nvSpPr>
+        <p:spPr/>
+        <p:txBody>
+          <a:bodyPr/>
+          <a:lstStyle/>
+          <a:p>
+            <a:fld id="{9EBEBA0C-0AD4-124C-BACA-15E282F741D9}" type="slidenum">
+              <a:rPr lang="en-US" smtClean="0"/>
+              <a:pPr/>
+              <a:t>4</a:t>
+            </a:fld>
+            <a:endParaRPr lang="en-US"/>
+          </a:p>
+        </p:txBody>
+      </p:sp>
+    </p:spTree>
+  </p:cSld>
+  <p:clrMapOvr>
+    <a:masterClrMapping/>
+  </p:clrMapOvr>
+</p:notes>
+</file>
+
+<file path=ppt/notesSlides/notesSlide5.xml><?xml version="1.0" encoding="utf-8"?>
+<p:notes xmlns:a="http://schemas.openxmlformats.org/drawingml/2006/main" xmlns:r="http://schemas.openxmlformats.org/officeDocument/2006/relationships" xmlns:mc="http://schemas.openxmlformats.org/markup-compatibility/2006" xmlns:mv="urn:schemas-microsoft-com:mac:vml" xmlns:p="http://schemas.openxmlformats.org/presentationml/2006/main" mc:Ignorable="mv" mc:PreserveAttributes="mv:*">
+  <p:cSld>
+    <p:spTree>
+      <p:nvGrpSpPr>
+        <p:cNvPr id="1" name=""/>
+        <p:cNvGrpSpPr/>
+        <p:nvPr/>
+      </p:nvGrpSpPr>
+      <p:grpSpPr>
+        <a:xfrm>
+          <a:off x="0" y="0"/>
+          <a:ext cx="0" cy="0"/>
+          <a:chOff x="0" y="0"/>
+          <a:chExt cx="0" cy="0"/>
+        </a:xfrm>
+      </p:grpSpPr>
+      <p:sp>
+        <p:nvSpPr>
+          <p:cNvPr id="2" name="Slide Image Placeholder 1"/>
+          <p:cNvSpPr>
+            <a:spLocks noGrp="1" noRot="1" noChangeAspect="1"/>
+          </p:cNvSpPr>
+          <p:nvPr>
+            <p:ph type="sldImg"/>
+          </p:nvPr>
+        </p:nvSpPr>
+        <p:spPr/>
+      </p:sp>
+      <p:sp>
+        <p:nvSpPr>
+          <p:cNvPr id="3" name="Notes Placeholder 2"/>
+          <p:cNvSpPr>
+            <a:spLocks noGrp="1"/>
+          </p:cNvSpPr>
+          <p:nvPr>
+            <p:ph type="body" idx="1"/>
+          </p:nvPr>
+        </p:nvSpPr>
+        <p:spPr/>
+        <p:txBody>
+          <a:bodyPr>
+            <a:normAutofit/>
+          </a:bodyPr>
+          <a:lstStyle/>
+          <a:p>
+            <a:r>
+              <a:rPr lang="en-US" dirty="0" smtClean="0"/>
+              <a:t>I got this table from the recent </a:t>
+            </a:r>
+            <a:r>
+              <a:rPr lang="en-US" dirty="0" err="1" smtClean="0"/>
+              <a:t>TechReport</a:t>
+            </a:r>
+            <a:r>
+              <a:rPr lang="en-US" dirty="0" smtClean="0"/>
+              <a:t>, but absolutely certain that this is not complete list of AQM. In paper ARED, PI and REM algorithm were evaluated, with and without support of ECN. That is, without support - all control is done using packet dropping, with ECN - more intelligent way to inform TCP sender to slow down.</a:t>
+            </a:r>
+          </a:p>
+          <a:p>
+            <a:endParaRPr lang="en-US" dirty="0"/>
+          </a:p>
+        </p:txBody>
+      </p:sp>
+      <p:sp>
+        <p:nvSpPr>
+          <p:cNvPr id="4" name="Slide Number Placeholder 3"/>
+          <p:cNvSpPr>
+            <a:spLocks noGrp="1"/>
+          </p:cNvSpPr>
+          <p:nvPr>
+            <p:ph type="sldNum" sz="quarter" idx="10"/>
+          </p:nvPr>
+        </p:nvSpPr>
+        <p:spPr/>
+        <p:txBody>
+          <a:bodyPr/>
+          <a:lstStyle/>
+          <a:p>
+            <a:fld id="{9EBEBA0C-0AD4-124C-BACA-15E282F741D9}" type="slidenum">
+              <a:rPr lang="en-US" smtClean="0"/>
+              <a:pPr/>
+              <a:t>5</a:t>
+            </a:fld>
+            <a:endParaRPr lang="en-US"/>
+          </a:p>
+        </p:txBody>
+      </p:sp>
+    </p:spTree>
+  </p:cSld>
+  <p:clrMapOvr>
+    <a:masterClrMapping/>
+  </p:clrMapOvr>
+</p:notes>
+</file>
+
+<file path=ppt/notesSlides/notesSlide6.xml><?xml version="1.0" encoding="utf-8"?>
+<p:notes xmlns:a="http://schemas.openxmlformats.org/drawingml/2006/main" xmlns:r="http://schemas.openxmlformats.org/officeDocument/2006/relationships" xmlns:mc="http://schemas.openxmlformats.org/markup-compatibility/2006" xmlns:mv="urn:schemas-microsoft-com:mac:vml" xmlns:p="http://schemas.openxmlformats.org/presentationml/2006/main" mc:Ignorable="mv" mc:PreserveAttributes="mv:*">
+  <p:cSld>
+    <p:spTree>
+      <p:nvGrpSpPr>
+        <p:cNvPr id="1" name=""/>
+        <p:cNvGrpSpPr/>
+        <p:nvPr/>
+      </p:nvGrpSpPr>
+      <p:grpSpPr>
+        <a:xfrm>
+          <a:off x="0" y="0"/>
+          <a:ext cx="0" cy="0"/>
+          <a:chOff x="0" y="0"/>
+          <a:chExt cx="0" cy="0"/>
+        </a:xfrm>
+      </p:grpSpPr>
+      <p:sp>
+        <p:nvSpPr>
+          <p:cNvPr id="2" name="Slide Image Placeholder 1"/>
+          <p:cNvSpPr>
+            <a:spLocks noGrp="1" noRot="1" noChangeAspect="1"/>
+          </p:cNvSpPr>
+          <p:nvPr>
+            <p:ph type="sldImg"/>
+          </p:nvPr>
+        </p:nvSpPr>
+        <p:spPr/>
+      </p:sp>
+      <p:sp>
+        <p:nvSpPr>
+          <p:cNvPr id="3" name="Notes Placeholder 2"/>
+          <p:cNvSpPr>
+            <a:spLocks noGrp="1"/>
+          </p:cNvSpPr>
+          <p:nvPr>
+            <p:ph type="body" idx="1"/>
+          </p:nvPr>
+        </p:nvSpPr>
+        <p:spPr/>
+        <p:txBody>
+          <a:bodyPr>
+            <a:normAutofit/>
+          </a:bodyPr>
+          <a:lstStyle/>
+          <a:p>
+            <a:r>
+              <a:rPr lang="en-US" dirty="0" smtClean="0"/>
+              <a:t>Let's go briefly over the considered algorithms. ECN is defined by RFC3168 by designating two bits from </a:t>
+            </a:r>
+            <a:r>
+              <a:rPr lang="en-US" dirty="0" err="1" smtClean="0"/>
+              <a:t>DiffServ</a:t>
+            </a:r>
+            <a:r>
+              <a:rPr lang="en-US" dirty="0" smtClean="0"/>
+              <a:t> IP header. General idea is to mark packets with ECN bit if a router (GW1, </a:t>
+            </a:r>
+            <a:r>
+              <a:rPr lang="en-US" dirty="0" err="1" smtClean="0"/>
+              <a:t>GWn</a:t>
+            </a:r>
+            <a:r>
+              <a:rPr lang="en-US" dirty="0" smtClean="0"/>
+              <a:t> on the slide) considers link to be congested. That is original message D would come to destination as a D plus some indication Sf. If the receiver supports ECN, it would include indication about the congestion state in the path into TCP header (IP header collects information about path state, TCP header echoes this information). The sender should react on ECN signal as it would detect a packet loss.</a:t>
+            </a:r>
+            <a:endParaRPr lang="en-US" dirty="0"/>
+          </a:p>
+        </p:txBody>
+      </p:sp>
+      <p:sp>
+        <p:nvSpPr>
+          <p:cNvPr id="4" name="Slide Number Placeholder 3"/>
+          <p:cNvSpPr>
+            <a:spLocks noGrp="1"/>
+          </p:cNvSpPr>
+          <p:nvPr>
+            <p:ph type="sldNum" sz="quarter" idx="10"/>
+          </p:nvPr>
+        </p:nvSpPr>
+        <p:spPr/>
+        <p:txBody>
+          <a:bodyPr/>
+          <a:lstStyle/>
+          <a:p>
+            <a:fld id="{9EBEBA0C-0AD4-124C-BACA-15E282F741D9}" type="slidenum">
+              <a:rPr lang="en-US" smtClean="0"/>
+              <a:pPr/>
+              <a:t>6</a:t>
+            </a:fld>
+            <a:endParaRPr lang="en-US"/>
+          </a:p>
+        </p:txBody>
+      </p:sp>
+    </p:spTree>
+  </p:cSld>
+  <p:clrMapOvr>
+    <a:masterClrMapping/>
+  </p:clrMapOvr>
+</p:notes>
+</file>
+
+<file path=ppt/notesSlides/notesSlide7.xml><?xml version="1.0" encoding="utf-8"?>
+<p:notes xmlns:a="http://schemas.openxmlformats.org/drawingml/2006/main" xmlns:r="http://schemas.openxmlformats.org/officeDocument/2006/relationships" xmlns:mc="http://schemas.openxmlformats.org/markup-compatibility/2006" xmlns:mv="urn:schemas-microsoft-com:mac:vml" xmlns:p="http://schemas.openxmlformats.org/presentationml/2006/main" mc:Ignorable="mv" mc:PreserveAttributes="mv:*">
+  <p:cSld>
+    <p:spTree>
+      <p:nvGrpSpPr>
+        <p:cNvPr id="1" name=""/>
+        <p:cNvGrpSpPr/>
+        <p:nvPr/>
+      </p:nvGrpSpPr>
+      <p:grpSpPr>
+        <a:xfrm>
+          <a:off x="0" y="0"/>
+          <a:ext cx="0" cy="0"/>
+          <a:chOff x="0" y="0"/>
+          <a:chExt cx="0" cy="0"/>
+        </a:xfrm>
+      </p:grpSpPr>
+      <p:sp>
+        <p:nvSpPr>
+          <p:cNvPr id="2" name="Slide Image Placeholder 1"/>
+          <p:cNvSpPr>
+            <a:spLocks noGrp="1" noRot="1" noChangeAspect="1"/>
+          </p:cNvSpPr>
+          <p:nvPr>
+            <p:ph type="sldImg"/>
+          </p:nvPr>
+        </p:nvSpPr>
+        <p:spPr/>
+      </p:sp>
+      <p:sp>
+        <p:nvSpPr>
+          <p:cNvPr id="3" name="Notes Placeholder 2"/>
+          <p:cNvSpPr>
+            <a:spLocks noGrp="1"/>
+          </p:cNvSpPr>
+          <p:nvPr>
+            <p:ph type="body" idx="1"/>
+          </p:nvPr>
+        </p:nvSpPr>
+        <p:spPr/>
+        <p:txBody>
+          <a:bodyPr>
+            <a:normAutofit/>
+          </a:bodyPr>
+          <a:lstStyle/>
+          <a:p>
+            <a:r>
+              <a:rPr lang="en-US" dirty="0" smtClean="0"/>
+              <a:t>Adaptive RED is an actual AQM algorithm, which preventively (randomly) drops incoming and already present packet in queue if it size increased certain threshold. Original RED contain two thresholds min and max, which corresponds to linear increase of drop probability and if queue is more than max, then probability is 1. The Adaptive variant extends it by third threshold, but essentially the idea remain the same. When queue is between min and max - probability increases linearly, when between max and max2 - more rapid linear, instead of sudden, increase of probability.</a:t>
+            </a:r>
+          </a:p>
+          <a:p>
+            <a:endParaRPr lang="en-US" dirty="0"/>
+          </a:p>
+        </p:txBody>
+      </p:sp>
+      <p:sp>
+        <p:nvSpPr>
+          <p:cNvPr id="4" name="Slide Number Placeholder 3"/>
+          <p:cNvSpPr>
+            <a:spLocks noGrp="1"/>
+          </p:cNvSpPr>
+          <p:nvPr>
+            <p:ph type="sldNum" sz="quarter" idx="10"/>
+          </p:nvPr>
+        </p:nvSpPr>
+        <p:spPr/>
+        <p:txBody>
+          <a:bodyPr/>
+          <a:lstStyle/>
+          <a:p>
+            <a:fld id="{9EBEBA0C-0AD4-124C-BACA-15E282F741D9}" type="slidenum">
+              <a:rPr lang="en-US" smtClean="0"/>
+              <a:pPr/>
+              <a:t>7</a:t>
+            </a:fld>
+            <a:endParaRPr lang="en-US"/>
+          </a:p>
+        </p:txBody>
+      </p:sp>
+    </p:spTree>
+  </p:cSld>
+  <p:clrMapOvr>
+    <a:masterClrMapping/>
+  </p:clrMapOvr>
+</p:notes>
+</file>
+
+<file path=ppt/notesSlides/notesSlide8.xml><?xml version="1.0" encoding="utf-8"?>
+<p:notes xmlns:a="http://schemas.openxmlformats.org/drawingml/2006/main" xmlns:r="http://schemas.openxmlformats.org/officeDocument/2006/relationships" xmlns:mc="http://schemas.openxmlformats.org/markup-compatibility/2006" xmlns:mv="urn:schemas-microsoft-com:mac:vml" xmlns:p="http://schemas.openxmlformats.org/presentationml/2006/main" mc:Ignorable="mv" mc:PreserveAttributes="mv:*">
+  <p:cSld>
+    <p:spTree>
+      <p:nvGrpSpPr>
+        <p:cNvPr id="1" name=""/>
+        <p:cNvGrpSpPr/>
+        <p:nvPr/>
+      </p:nvGrpSpPr>
+      <p:grpSpPr>
+        <a:xfrm>
+          <a:off x="0" y="0"/>
+          <a:ext cx="0" cy="0"/>
+          <a:chOff x="0" y="0"/>
+          <a:chExt cx="0" cy="0"/>
+        </a:xfrm>
+      </p:grpSpPr>
+      <p:sp>
+        <p:nvSpPr>
+          <p:cNvPr id="2" name="Slide Image Placeholder 1"/>
+          <p:cNvSpPr>
+            <a:spLocks noGrp="1" noRot="1" noChangeAspect="1"/>
+          </p:cNvSpPr>
+          <p:nvPr>
+            <p:ph type="sldImg"/>
+          </p:nvPr>
+        </p:nvSpPr>
+        <p:spPr/>
+      </p:sp>
+      <p:sp>
+        <p:nvSpPr>
+          <p:cNvPr id="3" name="Notes Placeholder 2"/>
+          <p:cNvSpPr>
+            <a:spLocks noGrp="1"/>
+          </p:cNvSpPr>
+          <p:nvPr>
+            <p:ph type="body" idx="1"/>
+          </p:nvPr>
+        </p:nvSpPr>
+        <p:spPr/>
+        <p:txBody>
+          <a:bodyPr>
+            <a:normAutofit/>
+          </a:bodyPr>
+          <a:lstStyle/>
+          <a:p>
+            <a:r>
+              <a:rPr lang="en-US" dirty="0" smtClean="0"/>
+              <a:t>Proportional Integrator tries to limit buffering but a bit differently. It has one queuing threshold (so called queue reference), which selected a baseline. Periodically (~10ms) it recalculates the drop probability as a function of instantaneous size of the current queue value, last queue value and last probability. Such math allows to take into account </a:t>
+            </a:r>
+            <a:r>
+              <a:rPr lang="en-US" dirty="0" err="1" smtClean="0"/>
+              <a:t>queueing</a:t>
+            </a:r>
+            <a:r>
+              <a:rPr lang="en-US" dirty="0" smtClean="0"/>
+              <a:t> trends (if queue is decreasing there is no need to drop) and, in the same time, allows some bursts of traffic to go through.</a:t>
+            </a:r>
+            <a:endParaRPr lang="en-US" dirty="0"/>
+          </a:p>
+        </p:txBody>
+      </p:sp>
+      <p:sp>
+        <p:nvSpPr>
+          <p:cNvPr id="4" name="Slide Number Placeholder 3"/>
+          <p:cNvSpPr>
+            <a:spLocks noGrp="1"/>
+          </p:cNvSpPr>
+          <p:nvPr>
+            <p:ph type="sldNum" sz="quarter" idx="10"/>
+          </p:nvPr>
+        </p:nvSpPr>
+        <p:spPr/>
+        <p:txBody>
+          <a:bodyPr/>
+          <a:lstStyle/>
+          <a:p>
+            <a:fld id="{9EBEBA0C-0AD4-124C-BACA-15E282F741D9}" type="slidenum">
+              <a:rPr lang="en-US" smtClean="0"/>
+              <a:pPr/>
+              <a:t>8</a:t>
+            </a:fld>
+            <a:endParaRPr lang="en-US"/>
+          </a:p>
+        </p:txBody>
+      </p:sp>
+    </p:spTree>
+  </p:cSld>
+  <p:clrMapOvr>
+    <a:masterClrMapping/>
+  </p:clrMapOvr>
+</p:notes>
+</file>
+
+<file path=ppt/notesSlides/notesSlide9.xml><?xml version="1.0" encoding="utf-8"?>
+<p:notes xmlns:a="http://schemas.openxmlformats.org/drawingml/2006/main" xmlns:r="http://schemas.openxmlformats.org/officeDocument/2006/relationships" xmlns:mc="http://schemas.openxmlformats.org/markup-compatibility/2006" xmlns:mv="urn:schemas-microsoft-com:mac:vml" xmlns:p="http://schemas.openxmlformats.org/presentationml/2006/main" mc:Ignorable="mv" mc:PreserveAttributes="mv:*">
+  <p:cSld>
+    <p:spTree>
+      <p:nvGrpSpPr>
+        <p:cNvPr id="1" name=""/>
+        <p:cNvGrpSpPr/>
+        <p:nvPr/>
+      </p:nvGrpSpPr>
+      <p:grpSpPr>
+        <a:xfrm>
+          <a:off x="0" y="0"/>
+          <a:ext cx="0" cy="0"/>
+          <a:chOff x="0" y="0"/>
+          <a:chExt cx="0" cy="0"/>
+        </a:xfrm>
+      </p:grpSpPr>
+      <p:sp>
+        <p:nvSpPr>
+          <p:cNvPr id="2" name="Slide Image Placeholder 1"/>
+          <p:cNvSpPr>
+            <a:spLocks noGrp="1" noRot="1" noChangeAspect="1"/>
+          </p:cNvSpPr>
+          <p:nvPr>
+            <p:ph type="sldImg"/>
+          </p:nvPr>
+        </p:nvSpPr>
+        <p:spPr/>
+      </p:sp>
+      <p:sp>
+        <p:nvSpPr>
+          <p:cNvPr id="3" name="Notes Placeholder 2"/>
+          <p:cNvSpPr>
+            <a:spLocks noGrp="1"/>
+          </p:cNvSpPr>
+          <p:nvPr>
+            <p:ph type="body" idx="1"/>
+          </p:nvPr>
+        </p:nvSpPr>
+        <p:spPr/>
+        <p:txBody>
+          <a:bodyPr>
+            <a:normAutofit/>
+          </a:bodyPr>
+          <a:lstStyle/>
+          <a:p>
+            <a:r>
+              <a:rPr lang="en-US" dirty="0" smtClean="0"/>
+              <a:t>Essentially the same idea is behind the Random Exponential Marking algorithm. It takes into account not only the queue sizes, but also the input/output rates (</a:t>
+            </a:r>
+            <a:r>
+              <a:rPr lang="en-US" dirty="0" err="1" smtClean="0"/>
+              <a:t>x(t</a:t>
+            </a:r>
+            <a:r>
+              <a:rPr lang="en-US" dirty="0" smtClean="0"/>
+              <a:t>) - forwarding rate and C is capacity). That is, if forwarding rate is less then capacity, the queue will eventually decrease without any need to drop/mark packets. Otherwise, the marking/dropping probability is some exponential function.</a:t>
+            </a:r>
+          </a:p>
+          <a:p>
+            <a:endParaRPr lang="en-US" dirty="0"/>
+          </a:p>
+        </p:txBody>
+      </p:sp>
+      <p:sp>
+        <p:nvSpPr>
+          <p:cNvPr id="4" name="Slide Number Placeholder 3"/>
+          <p:cNvSpPr>
+            <a:spLocks noGrp="1"/>
+          </p:cNvSpPr>
+          <p:nvPr>
+            <p:ph type="sldNum" sz="quarter" idx="10"/>
+          </p:nvPr>
+        </p:nvSpPr>
+        <p:spPr/>
+        <p:txBody>
+          <a:bodyPr/>
+          <a:lstStyle/>
+          <a:p>
+            <a:fld id="{9EBEBA0C-0AD4-124C-BACA-15E282F741D9}" type="slidenum">
+              <a:rPr lang="en-US" smtClean="0"/>
+              <a:pPr/>
+              <a:t>9</a:t>
+            </a:fld>
+            <a:endParaRPr lang="en-US"/>
+          </a:p>
+        </p:txBody>
+      </p:sp>
+    </p:spTree>
+  </p:cSld>
+  <p:clrMapOvr>
+    <a:masterClrMapping/>
+  </p:clrMapOvr>
+</p:notes>
+</file>
+
 <file path=ppt/slideLayouts/slideLayout1.xml><?xml version="1.0" encoding="utf-8"?>
 <p:sldLayout xmlns:a="http://schemas.openxmlformats.org/drawingml/2006/main" xmlns:r="http://schemas.openxmlformats.org/officeDocument/2006/relationships" xmlns:mc="http://schemas.openxmlformats.org/markup-compatibility/2006" xmlns:mv="urn:schemas-microsoft-com:mac:vml" xmlns:p="http://schemas.openxmlformats.org/presentationml/2006/main" mc:Ignorable="mv" mc:PreserveAttributes="mv:*" type="title" preserve="1">
   <p:cSld name="Title Slide">
@@ -775,7 +2913,8 @@
           <a:p>
             <a:fld id="{D5784463-BBE9-E948-9C90-7928A35A2B96}" type="datetime1">
               <a:rPr lang="en-US" smtClean="0"/>
-              <a:t>4/26/09</a:t>
+              <a:pPr/>
+              <a:t>4/28/09</a:t>
             </a:fld>
             <a:endParaRPr lang="en-US"/>
           </a:p>
@@ -817,6 +2956,7 @@
           <a:p>
             <a:fld id="{A40A7289-E6BD-8442-BEC7-EC6744512031}" type="slidenum">
               <a:rPr lang="en-US" smtClean="0"/>
+              <a:pPr/>
               <a:t>‹#›</a:t>
             </a:fld>
             <a:endParaRPr lang="en-US"/>
@@ -1074,7 +3214,8 @@
           <a:p>
             <a:fld id="{1F1D9056-83FB-DE47-9D2D-E4D70AC31C75}" type="datetime1">
               <a:rPr lang="en-US" smtClean="0"/>
-              <a:t>4/26/09</a:t>
+              <a:pPr/>
+              <a:t>4/28/09</a:t>
             </a:fld>
             <a:endParaRPr lang="en-US"/>
           </a:p>
@@ -1116,6 +3257,7 @@
           <a:p>
             <a:fld id="{A40A7289-E6BD-8442-BEC7-EC6744512031}" type="slidenum">
               <a:rPr lang="en-US" smtClean="0"/>
+              <a:pPr/>
               <a:t>‹#›</a:t>
             </a:fld>
             <a:endParaRPr lang="en-US"/>
@@ -1249,7 +3391,8 @@
           <a:p>
             <a:fld id="{8480EF78-05E5-CB4F-BE94-EEB257608FB7}" type="datetime1">
               <a:rPr lang="en-US" smtClean="0"/>
-              <a:t>4/26/09</a:t>
+              <a:pPr/>
+              <a:t>4/28/09</a:t>
             </a:fld>
             <a:endParaRPr lang="en-US"/>
           </a:p>
@@ -1291,6 +3434,7 @@
           <a:p>
             <a:fld id="{A40A7289-E6BD-8442-BEC7-EC6744512031}" type="slidenum">
               <a:rPr lang="en-US" smtClean="0"/>
+              <a:pPr/>
               <a:t>‹#›</a:t>
             </a:fld>
             <a:endParaRPr lang="en-US"/>
@@ -1414,7 +3558,8 @@
           <a:p>
             <a:fld id="{12F8F781-0495-264C-B707-62FDE3F714A5}" type="datetime1">
               <a:rPr lang="en-US" smtClean="0"/>
-              <a:t>4/26/09</a:t>
+              <a:pPr/>
+              <a:t>4/28/09</a:t>
             </a:fld>
             <a:endParaRPr lang="en-US"/>
           </a:p>
@@ -1456,6 +3601,7 @@
           <a:p>
             <a:fld id="{A40A7289-E6BD-8442-BEC7-EC6744512031}" type="slidenum">
               <a:rPr lang="en-US" smtClean="0"/>
+              <a:pPr/>
               <a:t>‹#›</a:t>
             </a:fld>
             <a:endParaRPr lang="en-US"/>
@@ -1672,7 +3818,8 @@
           <a:p>
             <a:fld id="{80BED549-F2E9-8948-A5D3-11085D9D8588}" type="datetime1">
               <a:rPr lang="en-US" smtClean="0"/>
-              <a:t>4/26/09</a:t>
+              <a:pPr/>
+              <a:t>4/28/09</a:t>
             </a:fld>
             <a:endParaRPr lang="en-US"/>
           </a:p>
@@ -1714,6 +3861,7 @@
           <a:p>
             <a:fld id="{A40A7289-E6BD-8442-BEC7-EC6744512031}" type="slidenum">
               <a:rPr lang="en-US" smtClean="0"/>
+              <a:pPr/>
               <a:t>‹#›</a:t>
             </a:fld>
             <a:endParaRPr lang="en-US"/>
@@ -2124,7 +4272,8 @@
           <a:p>
             <a:fld id="{6A00EB78-045E-3D4C-AE1C-D6FEC7E1EF55}" type="datetime1">
               <a:rPr lang="en-US" smtClean="0"/>
-              <a:t>4/26/09</a:t>
+              <a:pPr/>
+              <a:t>4/28/09</a:t>
             </a:fld>
             <a:endParaRPr lang="en-US"/>
           </a:p>
@@ -2166,6 +4315,7 @@
           <a:p>
             <a:fld id="{A40A7289-E6BD-8442-BEC7-EC6744512031}" type="slidenum">
               <a:rPr lang="en-US" smtClean="0"/>
+              <a:pPr/>
               <a:t>‹#›</a:t>
             </a:fld>
             <a:endParaRPr lang="en-US"/>
@@ -2602,7 +4752,8 @@
           <a:p>
             <a:fld id="{90BC8819-C9DF-BD43-AFAA-972C27BE9BF7}" type="datetime1">
               <a:rPr lang="en-US" smtClean="0"/>
-              <a:t>4/26/09</a:t>
+              <a:pPr/>
+              <a:t>4/28/09</a:t>
             </a:fld>
             <a:endParaRPr lang="en-US"/>
           </a:p>
@@ -2644,6 +4795,7 @@
           <a:p>
             <a:fld id="{A40A7289-E6BD-8442-BEC7-EC6744512031}" type="slidenum">
               <a:rPr lang="en-US" smtClean="0"/>
+              <a:pPr/>
               <a:t>‹#›</a:t>
             </a:fld>
             <a:endParaRPr lang="en-US"/>
@@ -2720,7 +4872,8 @@
           <a:p>
             <a:fld id="{3EA9F2E2-2ED6-1F4F-99A4-ABBFF5DA37D6}" type="datetime1">
               <a:rPr lang="en-US" smtClean="0"/>
-              <a:t>4/26/09</a:t>
+              <a:pPr/>
+              <a:t>4/28/09</a:t>
             </a:fld>
             <a:endParaRPr lang="en-US"/>
           </a:p>
@@ -2762,6 +4915,7 @@
           <a:p>
             <a:fld id="{A40A7289-E6BD-8442-BEC7-EC6744512031}" type="slidenum">
               <a:rPr lang="en-US" smtClean="0"/>
+              <a:pPr/>
               <a:t>‹#›</a:t>
             </a:fld>
             <a:endParaRPr lang="en-US"/>
@@ -2856,7 +5010,8 @@
           <a:p>
             <a:fld id="{D9BE220A-2D63-324B-9167-C6FBB7954C02}" type="datetime1">
               <a:rPr lang="en-US" smtClean="0"/>
-              <a:t>4/26/09</a:t>
+              <a:pPr/>
+              <a:t>4/28/09</a:t>
             </a:fld>
             <a:endParaRPr lang="en-US"/>
           </a:p>
@@ -2898,6 +5053,7 @@
           <a:p>
             <a:fld id="{A40A7289-E6BD-8442-BEC7-EC6744512031}" type="slidenum">
               <a:rPr lang="en-US" smtClean="0"/>
+              <a:pPr/>
               <a:t>‹#›</a:t>
             </a:fld>
             <a:endParaRPr lang="en-US"/>
@@ -3167,7 +5323,8 @@
           <a:p>
             <a:fld id="{63A01F8E-5F92-9441-B7D5-4BB9D5D78039}" type="datetime1">
               <a:rPr lang="en-US" smtClean="0"/>
-              <a:t>4/26/09</a:t>
+              <a:pPr/>
+              <a:t>4/28/09</a:t>
             </a:fld>
             <a:endParaRPr lang="en-US"/>
           </a:p>
@@ -3209,6 +5366,7 @@
           <a:p>
             <a:fld id="{A40A7289-E6BD-8442-BEC7-EC6744512031}" type="slidenum">
               <a:rPr lang="en-US" smtClean="0"/>
+              <a:pPr/>
               <a:t>‹#›</a:t>
             </a:fld>
             <a:endParaRPr lang="en-US"/>
@@ -3294,7 +5452,8 @@
           <a:p>
             <a:fld id="{B890728F-22F9-7646-802F-398D22470450}" type="datetime1">
               <a:rPr lang="en-US" smtClean="0"/>
-              <a:t>4/26/09</a:t>
+              <a:pPr/>
+              <a:t>4/28/09</a:t>
             </a:fld>
             <a:endParaRPr lang="en-US"/>
           </a:p>
@@ -3336,6 +5495,7 @@
           <a:p>
             <a:fld id="{A40A7289-E6BD-8442-BEC7-EC6744512031}" type="slidenum">
               <a:rPr lang="en-US" smtClean="0"/>
+              <a:pPr/>
               <a:t>‹#›</a:t>
             </a:fld>
             <a:endParaRPr lang="en-US"/>
@@ -4050,7 +6210,8 @@
           <a:p>
             <a:fld id="{BD894477-06C5-B443-9009-40ABE14F58DB}" type="datetime1">
               <a:rPr lang="en-US" smtClean="0"/>
-              <a:t>4/26/09</a:t>
+              <a:pPr/>
+              <a:t>4/28/09</a:t>
             </a:fld>
             <a:endParaRPr lang="en-US"/>
           </a:p>
@@ -4132,6 +6293,7 @@
           <a:p>
             <a:fld id="{A40A7289-E6BD-8442-BEC7-EC6744512031}" type="slidenum">
               <a:rPr lang="en-US" smtClean="0"/>
+              <a:pPr/>
               <a:t>‹#›</a:t>
             </a:fld>
             <a:endParaRPr lang="en-US"/>
@@ -4600,11 +6762,7 @@
             </a:pPr>
             <a:r>
               <a:rPr lang="en-US" dirty="0" smtClean="0"/>
-              <a:t>Long </a:t>
-            </a:r>
-            <a:r>
-              <a:rPr lang="en-US" dirty="0" smtClean="0"/>
-              <a:t>Le, Jay </a:t>
+              <a:t>Long Le, Jay </a:t>
             </a:r>
             <a:r>
               <a:rPr lang="en-US" dirty="0" err="1" smtClean="0"/>
@@ -4620,11 +6778,7 @@
             </a:r>
             <a:r>
               <a:rPr lang="en-US" dirty="0" smtClean="0"/>
-              <a:t> and F</a:t>
-            </a:r>
-            <a:r>
-              <a:rPr lang="en-US" dirty="0" smtClean="0"/>
-              <a:t>. </a:t>
+              <a:t> and F. </a:t>
             </a:r>
             <a:r>
               <a:rPr lang="en-US" dirty="0" err="1" smtClean="0"/>
@@ -4636,11 +6790,7 @@
             </a:r>
             <a:r>
               <a:rPr lang="en-US" sz="2000" i="1" dirty="0" smtClean="0"/>
-              <a:t>Department of Computer </a:t>
-            </a:r>
-            <a:r>
-              <a:rPr lang="en-US" sz="2000" i="1" dirty="0" smtClean="0"/>
-              <a:t>Science</a:t>
+              <a:t>Department of Computer Science</a:t>
             </a:r>
           </a:p>
           <a:p>
@@ -4651,11 +6801,7 @@
             </a:pPr>
             <a:r>
               <a:rPr lang="en-US" sz="2000" i="1" dirty="0" smtClean="0"/>
-              <a:t>University </a:t>
-            </a:r>
-            <a:r>
-              <a:rPr lang="en-US" sz="2000" i="1" dirty="0" smtClean="0"/>
-              <a:t>of North Carolina at Chapel Hill</a:t>
+              <a:t>University of North Carolina at Chapel Hill</a:t>
             </a:r>
             <a:endParaRPr lang="en-US" sz="2000" dirty="0"/>
           </a:p>
@@ -4708,6 +6854,7 @@
           <a:p>
             <a:fld id="{A40A7289-E6BD-8442-BEC7-EC6744512031}" type="slidenum">
               <a:rPr lang="en-US" smtClean="0"/>
+              <a:pPr/>
               <a:t>1</a:t>
             </a:fld>
             <a:endParaRPr lang="en-US"/>
@@ -5022,7 +7169,7 @@
         <mc:AlternateContent>
           <mc:Choice xmlns:ma="http://schemas.microsoft.com/office/mac/drawingml/2008/main" Requires="ma">
             <p:blipFill>
-              <a:blip r:embed="rId2"/>
+              <a:blip r:embed="rId3"/>
               <a:stretch>
                 <a:fillRect/>
               </a:stretch>
@@ -5030,7 +7177,7 @@
           </mc:Choice>
           <mc:Fallback>
             <p:blipFill>
-              <a:blip r:embed="rId3"/>
+              <a:blip r:embed="rId4"/>
               <a:stretch>
                 <a:fillRect/>
               </a:stretch>
@@ -5301,6 +7448,7 @@
           <a:p>
             <a:fld id="{A40A7289-E6BD-8442-BEC7-EC6744512031}" type="slidenum">
               <a:rPr lang="en-US" smtClean="0"/>
+              <a:pPr/>
               <a:t>11</a:t>
             </a:fld>
             <a:endParaRPr lang="en-US"/>
@@ -5318,7 +7466,7 @@
         <mc:AlternateContent>
           <mc:Choice xmlns:ma="http://schemas.microsoft.com/office/mac/drawingml/2008/main" Requires="ma">
             <p:blipFill>
-              <a:blip r:embed="rId2"/>
+              <a:blip r:embed="rId3"/>
               <a:stretch>
                 <a:fillRect/>
               </a:stretch>
@@ -5326,7 +7474,7 @@
           </mc:Choice>
           <mc:Fallback>
             <p:blipFill>
-              <a:blip r:embed="rId3"/>
+              <a:blip r:embed="rId4"/>
               <a:stretch>
                 <a:fillRect/>
               </a:stretch>
@@ -5537,7 +7685,7 @@
 </file>
 
 <file path=ppt/slides/slide12.xml><?xml version="1.0" encoding="utf-8"?>
-<p:sld xmlns:a="http://schemas.openxmlformats.org/drawingml/2006/main" xmlns:r="http://schemas.openxmlformats.org/officeDocument/2006/relationships" xmlns:mc="http://schemas.openxmlformats.org/markup-compatibility/2006" xmlns:mv="urn:schemas-microsoft-com:mac:vml" xmlns:p="http://schemas.openxmlformats.org/presentationml/2006/main" mc:Ignorable="mv" mc:PreserveAttributes="mv:*">
+<p:sld xmlns:a="http://schemas.openxmlformats.org/drawingml/2006/main" xmlns:r="http://schemas.openxmlformats.org/officeDocument/2006/relationships" xmlns:mc="http://schemas.openxmlformats.org/markup-compatibility/2006" xmlns:mv="urn:schemas-microsoft-com:mac:vml" xmlns:p="http://schemas.openxmlformats.org/presentationml/2006/main" mc:Ignorable="mv" mc:PreserveAttributes="mv:*" show="0">
   <p:cSld>
     <p:spTree>
       <p:nvGrpSpPr>
@@ -5597,6 +7745,7 @@
           <a:p>
             <a:fld id="{A40A7289-E6BD-8442-BEC7-EC6744512031}" type="slidenum">
               <a:rPr lang="en-US" smtClean="0"/>
+              <a:pPr/>
               <a:t>12</a:t>
             </a:fld>
             <a:endParaRPr lang="en-US"/>
@@ -5863,6 +8012,7 @@
   <p:clrMapOvr>
     <a:masterClrMapping/>
   </p:clrMapOvr>
+  <p:transition/>
   <p:timing>
     <p:tnLst>
       <p:par>
@@ -5939,6 +8089,7 @@
           <a:p>
             <a:fld id="{A40A7289-E6BD-8442-BEC7-EC6744512031}" type="slidenum">
               <a:rPr lang="en-US" smtClean="0"/>
+              <a:pPr/>
               <a:t>13</a:t>
             </a:fld>
             <a:endParaRPr lang="en-US"/>
@@ -5956,7 +8107,7 @@
         <mc:AlternateContent>
           <mc:Choice xmlns:ma="http://schemas.microsoft.com/office/mac/drawingml/2008/main" Requires="ma">
             <p:blipFill>
-              <a:blip r:embed="rId2"/>
+              <a:blip r:embed="rId3"/>
               <a:stretch>
                 <a:fillRect/>
               </a:stretch>
@@ -5964,7 +8115,7 @@
           </mc:Choice>
           <mc:Fallback>
             <p:blipFill>
-              <a:blip r:embed="rId3"/>
+              <a:blip r:embed="rId4"/>
               <a:stretch>
                 <a:fillRect/>
               </a:stretch>
@@ -6331,15 +8482,7 @@
           <a:p>
             <a:r>
               <a:rPr lang="en-US" dirty="0" smtClean="0"/>
-              <a:t>AQM evaluation:</a:t>
-            </a:r>
-            <a:r>
-              <a:rPr lang="en-US" dirty="0" smtClean="0"/>
-              <a:t> 90</a:t>
-            </a:r>
-            <a:r>
-              <a:rPr lang="en-US" dirty="0" smtClean="0"/>
-              <a:t>% Load</a:t>
+              <a:t>AQM evaluation: 90% Load</a:t>
             </a:r>
             <a:br>
               <a:rPr lang="en-US" dirty="0" smtClean="0"/>
@@ -6369,6 +8512,7 @@
           <a:p>
             <a:fld id="{A40A7289-E6BD-8442-BEC7-EC6744512031}" type="slidenum">
               <a:rPr lang="en-US" smtClean="0"/>
+              <a:pPr/>
               <a:t>14</a:t>
             </a:fld>
             <a:endParaRPr lang="en-US"/>
@@ -6386,7 +8530,7 @@
         <mc:AlternateContent>
           <mc:Choice xmlns:ma="http://schemas.microsoft.com/office/mac/drawingml/2008/main" Requires="ma">
             <p:blipFill>
-              <a:blip r:embed="rId2"/>
+              <a:blip r:embed="rId3"/>
               <a:stretch>
                 <a:fillRect/>
               </a:stretch>
@@ -6394,7 +8538,7 @@
           </mc:Choice>
           <mc:Fallback>
             <p:blipFill>
-              <a:blip r:embed="rId3"/>
+              <a:blip r:embed="rId4"/>
               <a:stretch>
                 <a:fillRect/>
               </a:stretch>
@@ -6594,6 +8738,13 @@
   <p:clrMapOvr>
     <a:masterClrMapping/>
   </p:clrMapOvr>
+  <p:timing>
+    <p:tnLst>
+      <p:par>
+        <p:cTn id="1" dur="indefinite" restart="never" nodeType="tmRoot"/>
+      </p:par>
+    </p:tnLst>
+  </p:timing>
 </p:sld>
 </file>
 
@@ -6633,15 +8784,7 @@
           <a:p>
             <a:r>
               <a:rPr lang="en-US" dirty="0" smtClean="0"/>
-              <a:t>AQM evaluation: </a:t>
-            </a:r>
-            <a:r>
-              <a:rPr lang="en-US" dirty="0" smtClean="0"/>
-              <a:t>98% </a:t>
-            </a:r>
-            <a:r>
-              <a:rPr lang="en-US" dirty="0" smtClean="0"/>
-              <a:t>Load</a:t>
+              <a:t>AQM evaluation: 98% Load</a:t>
             </a:r>
             <a:br>
               <a:rPr lang="en-US" dirty="0" smtClean="0"/>
@@ -6671,6 +8814,7 @@
           <a:p>
             <a:fld id="{A40A7289-E6BD-8442-BEC7-EC6744512031}" type="slidenum">
               <a:rPr lang="en-US" smtClean="0"/>
+              <a:pPr/>
               <a:t>15</a:t>
             </a:fld>
             <a:endParaRPr lang="en-US"/>
@@ -6688,7 +8832,7 @@
         <mc:AlternateContent>
           <mc:Choice xmlns:ma="http://schemas.microsoft.com/office/mac/drawingml/2008/main" Requires="ma">
             <p:blipFill>
-              <a:blip r:embed="rId2"/>
+              <a:blip r:embed="rId3"/>
               <a:stretch>
                 <a:fillRect/>
               </a:stretch>
@@ -6696,7 +8840,7 @@
           </mc:Choice>
           <mc:Fallback>
             <p:blipFill>
-              <a:blip r:embed="rId3"/>
+              <a:blip r:embed="rId4"/>
               <a:stretch>
                 <a:fillRect/>
               </a:stretch>
@@ -6896,6 +9040,13 @@
   <p:clrMapOvr>
     <a:masterClrMapping/>
   </p:clrMapOvr>
+  <p:timing>
+    <p:tnLst>
+      <p:par>
+        <p:cTn id="1" dur="indefinite" restart="never" nodeType="tmRoot"/>
+      </p:par>
+    </p:tnLst>
+  </p:timing>
 </p:sld>
 </file>
 
@@ -6965,6 +9116,7 @@
           <a:p>
             <a:fld id="{A40A7289-E6BD-8442-BEC7-EC6744512031}" type="slidenum">
               <a:rPr lang="en-US" smtClean="0"/>
+              <a:pPr/>
               <a:t>16</a:t>
             </a:fld>
             <a:endParaRPr lang="en-US"/>
@@ -6982,7 +9134,7 @@
         <mc:AlternateContent>
           <mc:Choice xmlns:ma="http://schemas.microsoft.com/office/mac/drawingml/2008/main" Requires="ma">
             <p:blipFill>
-              <a:blip r:embed="rId2"/>
+              <a:blip r:embed="rId3"/>
               <a:stretch>
                 <a:fillRect/>
               </a:stretch>
@@ -6990,7 +9142,7 @@
           </mc:Choice>
           <mc:Fallback>
             <p:blipFill>
-              <a:blip r:embed="rId3"/>
+              <a:blip r:embed="rId4"/>
               <a:stretch>
                 <a:fillRect/>
               </a:stretch>
@@ -7190,6 +9342,13 @@
   <p:clrMapOvr>
     <a:masterClrMapping/>
   </p:clrMapOvr>
+  <p:timing>
+    <p:tnLst>
+      <p:par>
+        <p:cTn id="1" dur="indefinite" restart="never" nodeType="tmRoot"/>
+      </p:par>
+    </p:tnLst>
+  </p:timing>
 </p:sld>
 </file>
 
@@ -7229,7 +9388,7 @@
           <a:p>
             <a:r>
               <a:rPr lang="en-US" dirty="0" smtClean="0"/>
-              <a:t>AQM evaluation: Signaling comparison (packet drop </a:t>
+              <a:t>AQM evaluation: 90% Signaling comparison (packet drop </a:t>
             </a:r>
             <a:r>
               <a:rPr lang="en-US" dirty="0" err="1" smtClean="0"/>
@@ -7260,6 +9419,7 @@
           <a:p>
             <a:fld id="{A40A7289-E6BD-8442-BEC7-EC6744512031}" type="slidenum">
               <a:rPr lang="en-US" smtClean="0"/>
+              <a:pPr/>
               <a:t>17</a:t>
             </a:fld>
             <a:endParaRPr lang="en-US"/>
@@ -7277,7 +9437,7 @@
         <mc:AlternateContent>
           <mc:Choice xmlns:ma="http://schemas.microsoft.com/office/mac/drawingml/2008/main" Requires="ma">
             <p:blipFill>
-              <a:blip r:embed="rId2"/>
+              <a:blip r:embed="rId3"/>
               <a:stretch>
                 <a:fillRect/>
               </a:stretch>
@@ -7285,7 +9445,7 @@
           </mc:Choice>
           <mc:Fallback>
             <p:blipFill>
-              <a:blip r:embed="rId3"/>
+              <a:blip r:embed="rId4"/>
               <a:stretch>
                 <a:fillRect/>
               </a:stretch>
@@ -7485,6 +9645,13 @@
   <p:clrMapOvr>
     <a:masterClrMapping/>
   </p:clrMapOvr>
+  <p:timing>
+    <p:tnLst>
+      <p:par>
+        <p:cTn id="1" dur="indefinite" restart="never" nodeType="tmRoot"/>
+      </p:par>
+    </p:tnLst>
+  </p:timing>
 </p:sld>
 </file>
 
@@ -7524,7 +9691,7 @@
           <a:p>
             <a:r>
               <a:rPr lang="en-US" dirty="0" smtClean="0"/>
-              <a:t>AQM evaluation: 90% load</a:t>
+              <a:t>AQM evaluation: 98% load</a:t>
             </a:r>
             <a:br>
               <a:rPr lang="en-US" dirty="0" smtClean="0"/>
@@ -7554,6 +9721,7 @@
           <a:p>
             <a:fld id="{A40A7289-E6BD-8442-BEC7-EC6744512031}" type="slidenum">
               <a:rPr lang="en-US" smtClean="0"/>
+              <a:pPr/>
               <a:t>18</a:t>
             </a:fld>
             <a:endParaRPr lang="en-US"/>
@@ -7562,7 +9730,7 @@
       </p:sp>
       <p:pic>
         <p:nvPicPr>
-          <p:cNvPr id="7" name="Picture 6"/>
+          <p:cNvPr id="6" name="Picture 5"/>
           <p:cNvPicPr>
             <a:picLocks noChangeAspect="1"/>
           </p:cNvPicPr>
@@ -7571,7 +9739,7 @@
         <mc:AlternateContent>
           <mc:Choice xmlns:ma="http://schemas.microsoft.com/office/mac/drawingml/2008/main" Requires="ma">
             <p:blipFill>
-              <a:blip r:embed="rId2"/>
+              <a:blip r:embed="rId3"/>
               <a:stretch>
                 <a:fillRect/>
               </a:stretch>
@@ -7579,7 +9747,7 @@
           </mc:Choice>
           <mc:Fallback>
             <p:blipFill>
-              <a:blip r:embed="rId3"/>
+              <a:blip r:embed="rId4"/>
               <a:stretch>
                 <a:fillRect/>
               </a:stretch>
@@ -7588,8 +9756,8 @@
         </mc:AlternateContent>
         <p:spPr>
           <a:xfrm>
-            <a:off x="1435608" y="1600200"/>
-            <a:ext cx="7174992" cy="4620428"/>
+            <a:off x="1612900" y="1524000"/>
+            <a:ext cx="6997700" cy="4484594"/>
           </a:xfrm>
           <a:prstGeom prst="rect">
             <a:avLst/>
@@ -7598,7 +9766,7 @@
       </p:pic>
       <p:sp>
         <p:nvSpPr>
-          <p:cNvPr id="8" name="Footer Placeholder 3"/>
+          <p:cNvPr id="7" name="Footer Placeholder 3"/>
           <p:cNvSpPr txBox="1">
             <a:spLocks/>
           </p:cNvSpPr>
@@ -7779,6 +9947,13 @@
   <p:clrMapOvr>
     <a:masterClrMapping/>
   </p:clrMapOvr>
+  <p:timing>
+    <p:tnLst>
+      <p:par>
+        <p:cTn id="1" dur="indefinite" restart="never" nodeType="tmRoot"/>
+      </p:par>
+    </p:tnLst>
+  </p:timing>
 </p:sld>
 </file>
 
@@ -7818,7 +9993,7 @@
           <a:p>
             <a:r>
               <a:rPr lang="en-US" dirty="0" smtClean="0"/>
-              <a:t>AQM evaluation: 98% load</a:t>
+              <a:t>AQM evaluation: 90% load</a:t>
             </a:r>
             <a:br>
               <a:rPr lang="en-US" dirty="0" smtClean="0"/>
@@ -7848,6 +10023,7 @@
           <a:p>
             <a:fld id="{A40A7289-E6BD-8442-BEC7-EC6744512031}" type="slidenum">
               <a:rPr lang="en-US" smtClean="0"/>
+              <a:pPr/>
               <a:t>19</a:t>
             </a:fld>
             <a:endParaRPr lang="en-US"/>
@@ -7856,7 +10032,7 @@
       </p:sp>
       <p:pic>
         <p:nvPicPr>
-          <p:cNvPr id="6" name="Picture 5"/>
+          <p:cNvPr id="7" name="Picture 6"/>
           <p:cNvPicPr>
             <a:picLocks noChangeAspect="1"/>
           </p:cNvPicPr>
@@ -7865,7 +10041,7 @@
         <mc:AlternateContent>
           <mc:Choice xmlns:ma="http://schemas.microsoft.com/office/mac/drawingml/2008/main" Requires="ma">
             <p:blipFill>
-              <a:blip r:embed="rId2"/>
+              <a:blip r:embed="rId3"/>
               <a:stretch>
                 <a:fillRect/>
               </a:stretch>
@@ -7873,7 +10049,7 @@
           </mc:Choice>
           <mc:Fallback>
             <p:blipFill>
-              <a:blip r:embed="rId3"/>
+              <a:blip r:embed="rId4"/>
               <a:stretch>
                 <a:fillRect/>
               </a:stretch>
@@ -7882,8 +10058,8 @@
         </mc:AlternateContent>
         <p:spPr>
           <a:xfrm>
-            <a:off x="1612900" y="1524000"/>
-            <a:ext cx="6997700" cy="4484594"/>
+            <a:off x="1435608" y="1600200"/>
+            <a:ext cx="7174992" cy="4620428"/>
           </a:xfrm>
           <a:prstGeom prst="rect">
             <a:avLst/>
@@ -7892,7 +10068,7 @@
       </p:pic>
       <p:sp>
         <p:nvSpPr>
-          <p:cNvPr id="7" name="Footer Placeholder 3"/>
+          <p:cNvPr id="8" name="Footer Placeholder 3"/>
           <p:cNvSpPr txBox="1">
             <a:spLocks/>
           </p:cNvSpPr>
@@ -8073,6 +10249,13 @@
   <p:clrMapOvr>
     <a:masterClrMapping/>
   </p:clrMapOvr>
+  <p:timing>
+    <p:tnLst>
+      <p:par>
+        <p:cTn id="1" dur="indefinite" restart="never" nodeType="tmRoot"/>
+      </p:par>
+    </p:tnLst>
+  </p:timing>
 </p:sld>
 </file>
 
@@ -8129,13 +10312,13 @@
         <p:spPr/>
         <p:txBody>
           <a:bodyPr>
-            <a:normAutofit lnSpcReduction="10000"/>
+            <a:normAutofit fontScale="92500"/>
           </a:bodyPr>
           <a:lstStyle/>
           <a:p>
             <a:r>
               <a:rPr lang="en-US" dirty="0" smtClean="0"/>
-              <a:t>What is wrong with routing performance?</a:t>
+              <a:t>Is something wrong with routing performance?</a:t>
             </a:r>
           </a:p>
           <a:p>
@@ -8263,6 +10446,7 @@
           <a:p>
             <a:fld id="{A40A7289-E6BD-8442-BEC7-EC6744512031}" type="slidenum">
               <a:rPr lang="en-US" smtClean="0"/>
+              <a:pPr/>
               <a:t>2</a:t>
             </a:fld>
             <a:endParaRPr lang="en-US"/>
@@ -8404,6 +10588,7 @@
           <a:p>
             <a:fld id="{A40A7289-E6BD-8442-BEC7-EC6744512031}" type="slidenum">
               <a:rPr lang="en-US" smtClean="0"/>
+              <a:pPr/>
               <a:t>20</a:t>
             </a:fld>
             <a:endParaRPr lang="en-US"/>
@@ -8421,7 +10606,7 @@
         <mc:AlternateContent>
           <mc:Choice xmlns:ma="http://schemas.microsoft.com/office/mac/drawingml/2008/main" Requires="ma">
             <p:blipFill>
-              <a:blip r:embed="rId2"/>
+              <a:blip r:embed="rId3"/>
               <a:stretch>
                 <a:fillRect/>
               </a:stretch>
@@ -8429,7 +10614,7 @@
           </mc:Choice>
           <mc:Fallback>
             <p:blipFill>
-              <a:blip r:embed="rId3"/>
+              <a:blip r:embed="rId4"/>
               <a:stretch>
                 <a:fillRect/>
               </a:stretch>
@@ -8629,11 +10814,18 @@
   <p:clrMapOvr>
     <a:masterClrMapping/>
   </p:clrMapOvr>
+  <p:timing>
+    <p:tnLst>
+      <p:par>
+        <p:cTn id="1" dur="indefinite" restart="never" nodeType="tmRoot"/>
+      </p:par>
+    </p:tnLst>
+  </p:timing>
 </p:sld>
 </file>
 
 <file path=ppt/slides/slide21.xml><?xml version="1.0" encoding="utf-8"?>
-<p:sld xmlns:a="http://schemas.openxmlformats.org/drawingml/2006/main" xmlns:r="http://schemas.openxmlformats.org/officeDocument/2006/relationships" xmlns:mc="http://schemas.openxmlformats.org/markup-compatibility/2006" xmlns:mv="urn:schemas-microsoft-com:mac:vml" xmlns:p="http://schemas.openxmlformats.org/presentationml/2006/main" mc:Ignorable="mv" mc:PreserveAttributes="mv:*">
+<p:sld xmlns:a="http://schemas.openxmlformats.org/drawingml/2006/main" xmlns:r="http://schemas.openxmlformats.org/officeDocument/2006/relationships" xmlns:mc="http://schemas.openxmlformats.org/markup-compatibility/2006" xmlns:mv="urn:schemas-microsoft-com:mac:vml" xmlns:p="http://schemas.openxmlformats.org/presentationml/2006/main" mc:Ignorable="mv" mc:PreserveAttributes="mv:*" show="0">
   <p:cSld>
     <p:spTree>
       <p:nvGrpSpPr>
@@ -8698,6 +10890,7 @@
           <a:p>
             <a:fld id="{A40A7289-E6BD-8442-BEC7-EC6744512031}" type="slidenum">
               <a:rPr lang="en-US" smtClean="0"/>
+              <a:pPr/>
               <a:t>21</a:t>
             </a:fld>
             <a:endParaRPr lang="en-US"/>
@@ -8715,7 +10908,7 @@
         <mc:AlternateContent>
           <mc:Choice xmlns:ma="http://schemas.microsoft.com/office/mac/drawingml/2008/main" Requires="ma">
             <p:blipFill>
-              <a:blip r:embed="rId2"/>
+              <a:blip r:embed="rId3"/>
               <a:stretch>
                 <a:fillRect/>
               </a:stretch>
@@ -8723,7 +10916,7 @@
           </mc:Choice>
           <mc:Fallback>
             <p:blipFill>
-              <a:blip r:embed="rId3"/>
+              <a:blip r:embed="rId4"/>
               <a:stretch>
                 <a:fillRect/>
               </a:stretch>
@@ -8923,6 +11116,7 @@
   <p:clrMapOvr>
     <a:masterClrMapping/>
   </p:clrMapOvr>
+  <p:transition/>
 </p:sld>
 </file>
 
@@ -8992,6 +11186,7 @@
           <a:p>
             <a:fld id="{A40A7289-E6BD-8442-BEC7-EC6744512031}" type="slidenum">
               <a:rPr lang="en-US" smtClean="0"/>
+              <a:pPr/>
               <a:t>22</a:t>
             </a:fld>
             <a:endParaRPr lang="en-US"/>
@@ -9009,7 +11204,7 @@
         <mc:AlternateContent>
           <mc:Choice xmlns:ma="http://schemas.microsoft.com/office/mac/drawingml/2008/main" Requires="ma">
             <p:blipFill>
-              <a:blip r:embed="rId2"/>
+              <a:blip r:embed="rId3"/>
               <a:stretch>
                 <a:fillRect/>
               </a:stretch>
@@ -9017,7 +11212,7 @@
           </mc:Choice>
           <mc:Fallback>
             <p:blipFill>
-              <a:blip r:embed="rId3"/>
+              <a:blip r:embed="rId4"/>
               <a:stretch>
                 <a:fillRect/>
               </a:stretch>
@@ -9217,6 +11412,13 @@
   <p:clrMapOvr>
     <a:masterClrMapping/>
   </p:clrMapOvr>
+  <p:timing>
+    <p:tnLst>
+      <p:par>
+        <p:cTn id="1" dur="indefinite" restart="never" nodeType="tmRoot"/>
+      </p:par>
+    </p:tnLst>
+  </p:timing>
 </p:sld>
 </file>
 
@@ -9375,6 +11577,7 @@
           <a:p>
             <a:fld id="{A40A7289-E6BD-8442-BEC7-EC6744512031}" type="slidenum">
               <a:rPr lang="en-US" smtClean="0"/>
+              <a:pPr/>
               <a:t>23</a:t>
             </a:fld>
             <a:endParaRPr lang="en-US"/>
@@ -9631,6 +11834,7 @@
           <a:p>
             <a:fld id="{A40A7289-E6BD-8442-BEC7-EC6744512031}" type="slidenum">
               <a:rPr lang="en-US" smtClean="0"/>
+              <a:pPr/>
               <a:t>24</a:t>
             </a:fld>
             <a:endParaRPr lang="en-US"/>
@@ -9975,15 +12179,7 @@
                   <a:srgbClr val="2A6D7D"/>
                 </a:solidFill>
               </a:rPr>
-              <a:t>Some </a:t>
-            </a:r>
-            <a:r>
-              <a:rPr lang="en-US" dirty="0" smtClean="0">
-                <a:solidFill>
-                  <a:srgbClr val="2A6D7D"/>
-                </a:solidFill>
-              </a:rPr>
-              <a:t>congestion avoidance (CA) algorithms wouldn’t be aware until loss is detected</a:t>
+              <a:t>Some congestion avoidance (CA) algorithms wouldn’t be aware until loss is detected</a:t>
             </a:r>
           </a:p>
           <a:p>
@@ -10100,6 +12296,7 @@
           <a:p>
             <a:fld id="{A40A7289-E6BD-8442-BEC7-EC6744512031}" type="slidenum">
               <a:rPr lang="en-US" smtClean="0"/>
+              <a:pPr/>
               <a:t>3</a:t>
             </a:fld>
             <a:endParaRPr lang="en-US"/>
@@ -10152,14 +12349,6 @@
               </a:rPr>
               <a:t> – Solutions -  Evaluations - Discussion</a:t>
             </a:r>
-            <a:endParaRPr lang="en-US" sz="1200" dirty="0">
-              <a:solidFill>
-                <a:schemeClr val="bg2">
-                  <a:shade val="50000"/>
-                  <a:satMod val="200000"/>
-                </a:schemeClr>
-              </a:solidFill>
-            </a:endParaRPr>
           </a:p>
         </p:txBody>
       </p:sp>
@@ -10379,6 +12568,7 @@
           <a:p>
             <a:fld id="{A40A7289-E6BD-8442-BEC7-EC6744512031}" type="slidenum">
               <a:rPr lang="en-US" smtClean="0"/>
+              <a:pPr/>
               <a:t>4</a:t>
             </a:fld>
             <a:endParaRPr lang="en-US"/>
@@ -10595,6 +12785,7 @@
           <a:p>
             <a:fld id="{A40A7289-E6BD-8442-BEC7-EC6744512031}" type="slidenum">
               <a:rPr lang="en-US" smtClean="0"/>
+              <a:pPr/>
               <a:t>5</a:t>
             </a:fld>
             <a:endParaRPr lang="en-US"/>
@@ -10612,7 +12803,7 @@
         <mc:AlternateContent>
           <mc:Choice xmlns:ma="http://schemas.microsoft.com/office/mac/drawingml/2008/main" Requires="ma">
             <p:blipFill>
-              <a:blip r:embed="rId2"/>
+              <a:blip r:embed="rId3"/>
               <a:stretch>
                 <a:fillRect/>
               </a:stretch>
@@ -10620,7 +12811,7 @@
           </mc:Choice>
           <mc:Fallback>
             <p:blipFill>
-              <a:blip r:embed="rId3"/>
+              <a:blip r:embed="rId4"/>
               <a:stretch>
                 <a:fillRect/>
               </a:stretch>
@@ -11068,7 +13259,7 @@
         <mc:AlternateContent>
           <mc:Choice xmlns:ma="http://schemas.microsoft.com/office/mac/drawingml/2008/main" Requires="ma">
             <p:blipFill>
-              <a:blip r:embed="rId2"/>
+              <a:blip r:embed="rId3"/>
               <a:srcRect t="-23336" b="-23336"/>
               <a:stretch>
                 <a:fillRect/>
@@ -11077,7 +13268,7 @@
           </mc:Choice>
           <mc:Fallback>
             <p:blipFill>
-              <a:blip r:embed="rId3"/>
+              <a:blip r:embed="rId4"/>
               <a:srcRect t="-23336" b="-23336"/>
               <a:stretch>
                 <a:fillRect/>
@@ -11109,6 +13300,7 @@
           <a:p>
             <a:fld id="{A40A7289-E6BD-8442-BEC7-EC6744512031}" type="slidenum">
               <a:rPr lang="en-US" smtClean="0"/>
+              <a:pPr/>
               <a:t>6</a:t>
             </a:fld>
             <a:endParaRPr lang="en-US"/>
@@ -11294,17 +13486,7 @@
                   </a:schemeClr>
                 </a:solidFill>
               </a:rPr>
-              <a:t>If link is congested, routers set ECN bit in the IP packets </a:t>
-            </a:r>
-            <a:r>
-              <a:rPr lang="en-US" sz="2200" dirty="0" smtClean="0">
-                <a:solidFill>
-                  <a:schemeClr val="accent1">
-                    <a:lumMod val="50000"/>
-                  </a:schemeClr>
-                </a:solidFill>
-              </a:rPr>
-              <a:t>(</a:t>
+              <a:t>If link is congested, routers set ECN bit in the IP packets (</a:t>
             </a:r>
             <a:r>
               <a:rPr lang="en-US" sz="2200" dirty="0" err="1" smtClean="0">
@@ -11495,6 +13677,7 @@
           <a:p>
             <a:fld id="{A40A7289-E6BD-8442-BEC7-EC6744512031}" type="slidenum">
               <a:rPr lang="en-US" smtClean="0"/>
+              <a:pPr/>
               <a:t>7</a:t>
             </a:fld>
             <a:endParaRPr lang="en-US"/>
@@ -11512,7 +13695,7 @@
         <mc:AlternateContent>
           <mc:Choice xmlns:ma="http://schemas.microsoft.com/office/mac/drawingml/2008/main" Requires="ma">
             <p:blipFill>
-              <a:blip r:embed="rId2"/>
+              <a:blip r:embed="rId3"/>
               <a:stretch>
                 <a:fillRect/>
               </a:stretch>
@@ -11520,7 +13703,7 @@
           </mc:Choice>
           <mc:Fallback>
             <p:blipFill>
-              <a:blip r:embed="rId3"/>
+              <a:blip r:embed="rId4"/>
               <a:stretch>
                 <a:fillRect/>
               </a:stretch>
@@ -11815,7 +13998,7 @@
         <mc:AlternateContent>
           <mc:Choice xmlns:ma="http://schemas.microsoft.com/office/mac/drawingml/2008/main" Requires="ma">
             <p:blipFill>
-              <a:blip r:embed="rId2"/>
+              <a:blip r:embed="rId3"/>
               <a:stretch>
                 <a:fillRect/>
               </a:stretch>
@@ -11823,7 +14006,7 @@
           </mc:Choice>
           <mc:Fallback>
             <p:blipFill>
-              <a:blip r:embed="rId3"/>
+              <a:blip r:embed="rId4"/>
               <a:stretch>
                 <a:fillRect/>
               </a:stretch>
@@ -12105,6 +14288,7 @@
           <a:p>
             <a:fld id="{A40A7289-E6BD-8442-BEC7-EC6744512031}" type="slidenum">
               <a:rPr lang="en-US" smtClean="0"/>
+              <a:pPr/>
               <a:t>9</a:t>
             </a:fld>
             <a:endParaRPr lang="en-US"/>
@@ -12122,7 +14306,7 @@
         <mc:AlternateContent>
           <mc:Choice xmlns:ma="http://schemas.microsoft.com/office/mac/drawingml/2008/main" Requires="ma">
             <p:blipFill>
-              <a:blip r:embed="rId2"/>
+              <a:blip r:embed="rId3"/>
               <a:stretch>
                 <a:fillRect/>
               </a:stretch>
@@ -12130,7 +14314,7 @@
           </mc:Choice>
           <mc:Fallback>
             <p:blipFill>
-              <a:blip r:embed="rId3"/>
+              <a:blip r:embed="rId4"/>
               <a:stretch>
                 <a:fillRect/>
               </a:stretch>

</xml_diff>